<commit_message>
Push all the fixes for final version
</commit_message>
<xml_diff>
--- a/Paper/Figures/NN Architecture.pptx
+++ b/Paper/Figures/NN Architecture.pptx
@@ -5,12 +5,14 @@
     <p:sldMasterId id="2147483684" r:id="rId1"/>
   </p:sldMasterIdLst>
   <p:notesMasterIdLst>
-    <p:notesMasterId r:id="rId5"/>
+    <p:notesMasterId r:id="rId7"/>
   </p:notesMasterIdLst>
   <p:sldIdLst>
     <p:sldId id="256" r:id="rId2"/>
     <p:sldId id="258" r:id="rId3"/>
     <p:sldId id="259" r:id="rId4"/>
+    <p:sldId id="260" r:id="rId5"/>
+    <p:sldId id="261" r:id="rId6"/>
   </p:sldIdLst>
   <p:sldSz cx="18288000" cy="9144000"/>
   <p:notesSz cx="6858000" cy="9144000"/>
@@ -199,7 +201,7 @@
           <a:p>
             <a:fld id="{5CBE71E4-C66C-9045-A3F0-793622CB0424}" type="datetimeFigureOut">
               <a:rPr lang="en-US" smtClean="0"/>
-              <a:t>9/19/24</a:t>
+              <a:t>2/24/25</a:t>
             </a:fld>
             <a:endParaRPr lang="en-US"/>
           </a:p>
@@ -757,6 +759,232 @@
 </p:notes>
 </file>
 
+<file path=ppt/notesSlides/notesSlide4.xml><?xml version="1.0" encoding="utf-8"?>
+<p:notes xmlns:a="http://schemas.openxmlformats.org/drawingml/2006/main" xmlns:r="http://schemas.openxmlformats.org/officeDocument/2006/relationships" xmlns:p="http://schemas.openxmlformats.org/presentationml/2006/main">
+  <p:cSld>
+    <p:spTree>
+      <p:nvGrpSpPr>
+        <p:cNvPr id="1" name="">
+          <a:extLst>
+            <a:ext uri="{FF2B5EF4-FFF2-40B4-BE49-F238E27FC236}">
+              <a16:creationId xmlns:a16="http://schemas.microsoft.com/office/drawing/2014/main" id="{8A6919FE-1AED-ADAB-EAE0-919E3DD1EC90}"/>
+            </a:ext>
+          </a:extLst>
+        </p:cNvPr>
+        <p:cNvGrpSpPr/>
+        <p:nvPr/>
+      </p:nvGrpSpPr>
+      <p:grpSpPr>
+        <a:xfrm>
+          <a:off x="0" y="0"/>
+          <a:ext cx="0" cy="0"/>
+          <a:chOff x="0" y="0"/>
+          <a:chExt cx="0" cy="0"/>
+        </a:xfrm>
+      </p:grpSpPr>
+      <p:sp>
+        <p:nvSpPr>
+          <p:cNvPr id="2" name="Slide Image Placeholder 1">
+            <a:extLst>
+              <a:ext uri="{FF2B5EF4-FFF2-40B4-BE49-F238E27FC236}">
+                <a16:creationId xmlns:a16="http://schemas.microsoft.com/office/drawing/2014/main" id="{C951E2BB-0162-5C52-FB9E-87B584464BB5}"/>
+              </a:ext>
+            </a:extLst>
+          </p:cNvPr>
+          <p:cNvSpPr>
+            <a:spLocks noGrp="1" noRot="1" noChangeAspect="1"/>
+          </p:cNvSpPr>
+          <p:nvPr>
+            <p:ph type="sldImg"/>
+          </p:nvPr>
+        </p:nvSpPr>
+        <p:spPr>
+          <a:xfrm>
+            <a:off x="342900" y="1143000"/>
+            <a:ext cx="6172200" cy="3086100"/>
+          </a:xfrm>
+        </p:spPr>
+      </p:sp>
+      <p:sp>
+        <p:nvSpPr>
+          <p:cNvPr id="3" name="Notes Placeholder 2">
+            <a:extLst>
+              <a:ext uri="{FF2B5EF4-FFF2-40B4-BE49-F238E27FC236}">
+                <a16:creationId xmlns:a16="http://schemas.microsoft.com/office/drawing/2014/main" id="{E60EA4BE-937F-896C-2E1C-DF6318ED9D27}"/>
+              </a:ext>
+            </a:extLst>
+          </p:cNvPr>
+          <p:cNvSpPr>
+            <a:spLocks noGrp="1"/>
+          </p:cNvSpPr>
+          <p:nvPr>
+            <p:ph type="body" idx="1"/>
+          </p:nvPr>
+        </p:nvSpPr>
+        <p:spPr/>
+        <p:txBody>
+          <a:bodyPr/>
+          <a:lstStyle/>
+          <a:p>
+            <a:endParaRPr lang="en-US" dirty="0"/>
+          </a:p>
+        </p:txBody>
+      </p:sp>
+      <p:sp>
+        <p:nvSpPr>
+          <p:cNvPr id="4" name="Slide Number Placeholder 3">
+            <a:extLst>
+              <a:ext uri="{FF2B5EF4-FFF2-40B4-BE49-F238E27FC236}">
+                <a16:creationId xmlns:a16="http://schemas.microsoft.com/office/drawing/2014/main" id="{4EA8DC45-598F-E811-310C-5E3C618E4CDE}"/>
+              </a:ext>
+            </a:extLst>
+          </p:cNvPr>
+          <p:cNvSpPr>
+            <a:spLocks noGrp="1"/>
+          </p:cNvSpPr>
+          <p:nvPr>
+            <p:ph type="sldNum" sz="quarter" idx="5"/>
+          </p:nvPr>
+        </p:nvSpPr>
+        <p:spPr/>
+        <p:txBody>
+          <a:bodyPr/>
+          <a:lstStyle/>
+          <a:p>
+            <a:fld id="{E840EEA3-A0C0-C440-BF97-35DABF0D1702}" type="slidenum">
+              <a:rPr lang="en-US" smtClean="0"/>
+              <a:t>4</a:t>
+            </a:fld>
+            <a:endParaRPr lang="en-US"/>
+          </a:p>
+        </p:txBody>
+      </p:sp>
+    </p:spTree>
+    <p:extLst>
+      <p:ext uri="{BB962C8B-B14F-4D97-AF65-F5344CB8AC3E}">
+        <p14:creationId xmlns:p14="http://schemas.microsoft.com/office/powerpoint/2010/main" val="1616238947"/>
+      </p:ext>
+    </p:extLst>
+  </p:cSld>
+  <p:clrMapOvr>
+    <a:masterClrMapping/>
+  </p:clrMapOvr>
+</p:notes>
+</file>
+
+<file path=ppt/notesSlides/notesSlide5.xml><?xml version="1.0" encoding="utf-8"?>
+<p:notes xmlns:a="http://schemas.openxmlformats.org/drawingml/2006/main" xmlns:r="http://schemas.openxmlformats.org/officeDocument/2006/relationships" xmlns:p="http://schemas.openxmlformats.org/presentationml/2006/main">
+  <p:cSld>
+    <p:spTree>
+      <p:nvGrpSpPr>
+        <p:cNvPr id="1" name="">
+          <a:extLst>
+            <a:ext uri="{FF2B5EF4-FFF2-40B4-BE49-F238E27FC236}">
+              <a16:creationId xmlns:a16="http://schemas.microsoft.com/office/drawing/2014/main" id="{179DA468-D935-8CAF-2674-E8FE53D93646}"/>
+            </a:ext>
+          </a:extLst>
+        </p:cNvPr>
+        <p:cNvGrpSpPr/>
+        <p:nvPr/>
+      </p:nvGrpSpPr>
+      <p:grpSpPr>
+        <a:xfrm>
+          <a:off x="0" y="0"/>
+          <a:ext cx="0" cy="0"/>
+          <a:chOff x="0" y="0"/>
+          <a:chExt cx="0" cy="0"/>
+        </a:xfrm>
+      </p:grpSpPr>
+      <p:sp>
+        <p:nvSpPr>
+          <p:cNvPr id="2" name="Slide Image Placeholder 1">
+            <a:extLst>
+              <a:ext uri="{FF2B5EF4-FFF2-40B4-BE49-F238E27FC236}">
+                <a16:creationId xmlns:a16="http://schemas.microsoft.com/office/drawing/2014/main" id="{EDDB13B6-B3C6-52A4-4E73-292AD431BEAB}"/>
+              </a:ext>
+            </a:extLst>
+          </p:cNvPr>
+          <p:cNvSpPr>
+            <a:spLocks noGrp="1" noRot="1" noChangeAspect="1"/>
+          </p:cNvSpPr>
+          <p:nvPr>
+            <p:ph type="sldImg"/>
+          </p:nvPr>
+        </p:nvSpPr>
+        <p:spPr>
+          <a:xfrm>
+            <a:off x="342900" y="1143000"/>
+            <a:ext cx="6172200" cy="3086100"/>
+          </a:xfrm>
+        </p:spPr>
+      </p:sp>
+      <p:sp>
+        <p:nvSpPr>
+          <p:cNvPr id="3" name="Notes Placeholder 2">
+            <a:extLst>
+              <a:ext uri="{FF2B5EF4-FFF2-40B4-BE49-F238E27FC236}">
+                <a16:creationId xmlns:a16="http://schemas.microsoft.com/office/drawing/2014/main" id="{A51886E2-A50F-EBEE-0D2F-A5A91AEAB4B2}"/>
+              </a:ext>
+            </a:extLst>
+          </p:cNvPr>
+          <p:cNvSpPr>
+            <a:spLocks noGrp="1"/>
+          </p:cNvSpPr>
+          <p:nvPr>
+            <p:ph type="body" idx="1"/>
+          </p:nvPr>
+        </p:nvSpPr>
+        <p:spPr/>
+        <p:txBody>
+          <a:bodyPr/>
+          <a:lstStyle/>
+          <a:p>
+            <a:endParaRPr lang="en-US" dirty="0"/>
+          </a:p>
+        </p:txBody>
+      </p:sp>
+      <p:sp>
+        <p:nvSpPr>
+          <p:cNvPr id="4" name="Slide Number Placeholder 3">
+            <a:extLst>
+              <a:ext uri="{FF2B5EF4-FFF2-40B4-BE49-F238E27FC236}">
+                <a16:creationId xmlns:a16="http://schemas.microsoft.com/office/drawing/2014/main" id="{122FB94D-B094-9BD0-B756-03FF8D0B8CD6}"/>
+              </a:ext>
+            </a:extLst>
+          </p:cNvPr>
+          <p:cNvSpPr>
+            <a:spLocks noGrp="1"/>
+          </p:cNvSpPr>
+          <p:nvPr>
+            <p:ph type="sldNum" sz="quarter" idx="5"/>
+          </p:nvPr>
+        </p:nvSpPr>
+        <p:spPr/>
+        <p:txBody>
+          <a:bodyPr/>
+          <a:lstStyle/>
+          <a:p>
+            <a:fld id="{E840EEA3-A0C0-C440-BF97-35DABF0D1702}" type="slidenum">
+              <a:rPr lang="en-US" smtClean="0"/>
+              <a:t>5</a:t>
+            </a:fld>
+            <a:endParaRPr lang="en-US"/>
+          </a:p>
+        </p:txBody>
+      </p:sp>
+    </p:spTree>
+    <p:extLst>
+      <p:ext uri="{BB962C8B-B14F-4D97-AF65-F5344CB8AC3E}">
+        <p14:creationId xmlns:p14="http://schemas.microsoft.com/office/powerpoint/2010/main" val="2700490936"/>
+      </p:ext>
+    </p:extLst>
+  </p:cSld>
+  <p:clrMapOvr>
+    <a:masterClrMapping/>
+  </p:clrMapOvr>
+</p:notes>
+</file>
+
 <file path=ppt/slideLayouts/slideLayout1.xml><?xml version="1.0" encoding="utf-8"?>
 <p:sldLayout xmlns:a="http://schemas.openxmlformats.org/drawingml/2006/main" xmlns:r="http://schemas.openxmlformats.org/officeDocument/2006/relationships" xmlns:p="http://schemas.openxmlformats.org/presentationml/2006/main" type="title" preserve="1">
   <p:cSld name="Title Slide">
@@ -888,7 +1116,7 @@
           <a:p>
             <a:fld id="{008797F6-C3EC-C742-9153-6E65A2DA26D7}" type="datetimeFigureOut">
               <a:rPr lang="en-US" smtClean="0"/>
-              <a:t>9/19/24</a:t>
+              <a:t>2/24/25</a:t>
             </a:fld>
             <a:endParaRPr lang="en-US"/>
           </a:p>
@@ -1058,7 +1286,7 @@
           <a:p>
             <a:fld id="{008797F6-C3EC-C742-9153-6E65A2DA26D7}" type="datetimeFigureOut">
               <a:rPr lang="en-US" smtClean="0"/>
-              <a:t>9/19/24</a:t>
+              <a:t>2/24/25</a:t>
             </a:fld>
             <a:endParaRPr lang="en-US"/>
           </a:p>
@@ -1238,7 +1466,7 @@
           <a:p>
             <a:fld id="{008797F6-C3EC-C742-9153-6E65A2DA26D7}" type="datetimeFigureOut">
               <a:rPr lang="en-US" smtClean="0"/>
-              <a:t>9/19/24</a:t>
+              <a:t>2/24/25</a:t>
             </a:fld>
             <a:endParaRPr lang="en-US"/>
           </a:p>
@@ -1408,7 +1636,7 @@
           <a:p>
             <a:fld id="{008797F6-C3EC-C742-9153-6E65A2DA26D7}" type="datetimeFigureOut">
               <a:rPr lang="en-US" smtClean="0"/>
-              <a:t>9/19/24</a:t>
+              <a:t>2/24/25</a:t>
             </a:fld>
             <a:endParaRPr lang="en-US"/>
           </a:p>
@@ -1654,7 +1882,7 @@
           <a:p>
             <a:fld id="{008797F6-C3EC-C742-9153-6E65A2DA26D7}" type="datetimeFigureOut">
               <a:rPr lang="en-US" smtClean="0"/>
-              <a:t>9/19/24</a:t>
+              <a:t>2/24/25</a:t>
             </a:fld>
             <a:endParaRPr lang="en-US"/>
           </a:p>
@@ -1886,7 +2114,7 @@
           <a:p>
             <a:fld id="{008797F6-C3EC-C742-9153-6E65A2DA26D7}" type="datetimeFigureOut">
               <a:rPr lang="en-US" smtClean="0"/>
-              <a:t>9/19/24</a:t>
+              <a:t>2/24/25</a:t>
             </a:fld>
             <a:endParaRPr lang="en-US"/>
           </a:p>
@@ -2253,7 +2481,7 @@
           <a:p>
             <a:fld id="{008797F6-C3EC-C742-9153-6E65A2DA26D7}" type="datetimeFigureOut">
               <a:rPr lang="en-US" smtClean="0"/>
-              <a:t>9/19/24</a:t>
+              <a:t>2/24/25</a:t>
             </a:fld>
             <a:endParaRPr lang="en-US"/>
           </a:p>
@@ -2371,7 +2599,7 @@
           <a:p>
             <a:fld id="{008797F6-C3EC-C742-9153-6E65A2DA26D7}" type="datetimeFigureOut">
               <a:rPr lang="en-US" smtClean="0"/>
-              <a:t>9/19/24</a:t>
+              <a:t>2/24/25</a:t>
             </a:fld>
             <a:endParaRPr lang="en-US"/>
           </a:p>
@@ -2466,7 +2694,7 @@
           <a:p>
             <a:fld id="{008797F6-C3EC-C742-9153-6E65A2DA26D7}" type="datetimeFigureOut">
               <a:rPr lang="en-US" smtClean="0"/>
-              <a:t>9/19/24</a:t>
+              <a:t>2/24/25</a:t>
             </a:fld>
             <a:endParaRPr lang="en-US"/>
           </a:p>
@@ -2743,7 +2971,7 @@
           <a:p>
             <a:fld id="{008797F6-C3EC-C742-9153-6E65A2DA26D7}" type="datetimeFigureOut">
               <a:rPr lang="en-US" smtClean="0"/>
-              <a:t>9/19/24</a:t>
+              <a:t>2/24/25</a:t>
             </a:fld>
             <a:endParaRPr lang="en-US"/>
           </a:p>
@@ -3000,7 +3228,7 @@
           <a:p>
             <a:fld id="{008797F6-C3EC-C742-9153-6E65A2DA26D7}" type="datetimeFigureOut">
               <a:rPr lang="en-US" smtClean="0"/>
-              <a:t>9/19/24</a:t>
+              <a:t>2/24/25</a:t>
             </a:fld>
             <a:endParaRPr lang="en-US"/>
           </a:p>
@@ -3213,7 +3441,7 @@
           <a:p>
             <a:fld id="{008797F6-C3EC-C742-9153-6E65A2DA26D7}" type="datetimeFigureOut">
               <a:rPr lang="en-US" smtClean="0"/>
-              <a:t>9/19/24</a:t>
+              <a:t>2/24/25</a:t>
             </a:fld>
             <a:endParaRPr lang="en-US"/>
           </a:p>
@@ -7439,10 +7667,10 @@
       </p:grpSpPr>
       <p:pic>
         <p:nvPicPr>
-          <p:cNvPr id="27" name="Picture 26" descr="A graph of a graph&#10;&#10;Description automatically generated">
-            <a:extLst>
-              <a:ext uri="{FF2B5EF4-FFF2-40B4-BE49-F238E27FC236}">
-                <a16:creationId xmlns:a16="http://schemas.microsoft.com/office/drawing/2014/main" id="{341308EC-BD73-C363-A127-5B0E0FB4790A}"/>
+          <p:cNvPr id="5" name="Picture 4" descr="A graph with a line&#10;&#10;AI-generated content may be incorrect.">
+            <a:extLst>
+              <a:ext uri="{FF2B5EF4-FFF2-40B4-BE49-F238E27FC236}">
+                <a16:creationId xmlns:a16="http://schemas.microsoft.com/office/drawing/2014/main" id="{F871D529-CECE-B258-C851-1D790755321D}"/>
               </a:ext>
             </a:extLst>
           </p:cNvPr>
@@ -7459,8 +7687,8 @@
         </p:blipFill>
         <p:spPr>
           <a:xfrm>
-            <a:off x="5481851" y="2293384"/>
-            <a:ext cx="11884309" cy="5820885"/>
+            <a:off x="5349337" y="2696788"/>
+            <a:ext cx="10295049" cy="5038002"/>
           </a:xfrm>
           <a:prstGeom prst="rect">
             <a:avLst/>
@@ -7481,7 +7709,7 @@
         </p:nvSpPr>
         <p:spPr>
           <a:xfrm>
-            <a:off x="1307289" y="7687192"/>
+            <a:off x="812789" y="7173569"/>
             <a:ext cx="703579" cy="523220"/>
           </a:xfrm>
           <a:prstGeom prst="rect">
@@ -7519,7 +7747,7 @@
         </p:nvGrpSpPr>
         <p:grpSpPr>
           <a:xfrm>
-            <a:off x="1307289" y="3207617"/>
+            <a:off x="1031122" y="4218015"/>
             <a:ext cx="2662587" cy="2487952"/>
             <a:chOff x="1288095" y="3468536"/>
             <a:chExt cx="2662587" cy="2487952"/>
@@ -7756,7 +7984,7 @@
         </p:nvSpPr>
         <p:spPr>
           <a:xfrm>
-            <a:off x="4226472" y="2455944"/>
+            <a:off x="4099472" y="3640732"/>
             <a:ext cx="1252433" cy="410291"/>
           </a:xfrm>
           <a:prstGeom prst="roundRect">
@@ -7789,7 +8017,7 @@
             <a:pPr algn="ctr"/>
             <a:r>
               <a:rPr lang="en-US" sz="1900" dirty="0"/>
-              <a:t>Input (5)</a:t>
+              <a:t>Input (6)</a:t>
             </a:r>
           </a:p>
         </p:txBody>
@@ -7808,7 +8036,7 @@
         </p:nvSpPr>
         <p:spPr>
           <a:xfrm>
-            <a:off x="4226472" y="3032550"/>
+            <a:off x="4099472" y="4217338"/>
             <a:ext cx="1252433" cy="410291"/>
           </a:xfrm>
           <a:prstGeom prst="roundRect">
@@ -7846,7 +8074,7 @@
             </a:r>
             <a:r>
               <a:rPr lang="en-US" sz="1900" dirty="0"/>
-              <a:t> (5)</a:t>
+              <a:t> (6)</a:t>
             </a:r>
           </a:p>
         </p:txBody>
@@ -7865,7 +8093,7 @@
         </p:nvSpPr>
         <p:spPr>
           <a:xfrm>
-            <a:off x="4226472" y="3609156"/>
+            <a:off x="4099472" y="4793944"/>
             <a:ext cx="1252433" cy="410291"/>
           </a:xfrm>
           <a:prstGeom prst="roundRect">
@@ -7922,7 +8150,7 @@
         </p:nvSpPr>
         <p:spPr>
           <a:xfrm>
-            <a:off x="4226472" y="4185762"/>
+            <a:off x="4099472" y="5370550"/>
             <a:ext cx="1252433" cy="410291"/>
           </a:xfrm>
           <a:prstGeom prst="roundRect">
@@ -7979,7 +8207,7 @@
         </p:nvSpPr>
         <p:spPr>
           <a:xfrm>
-            <a:off x="4226472" y="4762368"/>
+            <a:off x="4099472" y="5947156"/>
             <a:ext cx="1252433" cy="410291"/>
           </a:xfrm>
           <a:prstGeom prst="roundRect">
@@ -8017,68 +8245,7 @@
             </a:r>
             <a:r>
               <a:rPr lang="en-US" sz="1900" dirty="0"/>
-              <a:t> (4)</a:t>
-            </a:r>
-          </a:p>
-        </p:txBody>
-      </p:sp>
-      <p:sp>
-        <p:nvSpPr>
-          <p:cNvPr id="454" name="Rounded Rectangle 453">
-            <a:extLst>
-              <a:ext uri="{FF2B5EF4-FFF2-40B4-BE49-F238E27FC236}">
-                <a16:creationId xmlns:a16="http://schemas.microsoft.com/office/drawing/2014/main" id="{D718D9FB-56E5-DAD7-2550-E4F15E8280BE}"/>
-              </a:ext>
-            </a:extLst>
-          </p:cNvPr>
-          <p:cNvSpPr/>
-          <p:nvPr/>
-        </p:nvSpPr>
-        <p:spPr>
-          <a:xfrm>
-            <a:off x="4226472" y="5915580"/>
-            <a:ext cx="1252433" cy="410291"/>
-          </a:xfrm>
-          <a:prstGeom prst="roundRect">
-            <a:avLst/>
-          </a:prstGeom>
-          <a:solidFill>
-            <a:schemeClr val="accent1">
-              <a:lumMod val="60000"/>
-              <a:lumOff val="40000"/>
-            </a:schemeClr>
-          </a:solidFill>
-        </p:spPr>
-        <p:style>
-          <a:lnRef idx="2">
-            <a:schemeClr val="dk1"/>
-          </a:lnRef>
-          <a:fillRef idx="1">
-            <a:schemeClr val="lt1"/>
-          </a:fillRef>
-          <a:effectRef idx="0">
-            <a:schemeClr val="dk1"/>
-          </a:effectRef>
-          <a:fontRef idx="minor">
-            <a:schemeClr val="dk1"/>
-          </a:fontRef>
-        </p:style>
-        <p:txBody>
-          <a:bodyPr rtlCol="0" anchor="ctr"/>
-          <a:lstStyle/>
-          <a:p>
-            <a:pPr algn="ctr"/>
-            <a:r>
-              <a:rPr lang="en-US" sz="1900" dirty="0"/>
-              <a:t>Linear</a:t>
-            </a:r>
-            <a:r>
-              <a:rPr lang="en-US" sz="1100" dirty="0"/>
-              <a:t> </a:t>
-            </a:r>
-            <a:r>
-              <a:rPr lang="en-US" sz="1900" dirty="0"/>
-              <a:t>(4)</a:t>
+              <a:t> (3)</a:t>
             </a:r>
           </a:p>
         </p:txBody>
@@ -8101,7 +8268,7 @@
         </p:nvCxnSpPr>
         <p:spPr>
           <a:xfrm>
-            <a:off x="4852689" y="2866235"/>
+            <a:off x="4725689" y="4051023"/>
             <a:ext cx="0" cy="166315"/>
           </a:xfrm>
           <a:prstGeom prst="straightConnector1">
@@ -8147,7 +8314,7 @@
         </p:nvCxnSpPr>
         <p:spPr>
           <a:xfrm>
-            <a:off x="4852689" y="3442841"/>
+            <a:off x="4725689" y="4627629"/>
             <a:ext cx="0" cy="166315"/>
           </a:xfrm>
           <a:prstGeom prst="straightConnector1">
@@ -8193,7 +8360,7 @@
         </p:nvCxnSpPr>
         <p:spPr>
           <a:xfrm>
-            <a:off x="4852689" y="4019447"/>
+            <a:off x="4725689" y="5204235"/>
             <a:ext cx="0" cy="166315"/>
           </a:xfrm>
           <a:prstGeom prst="straightConnector1">
@@ -8239,53 +8406,8 @@
         </p:nvCxnSpPr>
         <p:spPr>
           <a:xfrm>
-            <a:off x="4852689" y="4596053"/>
+            <a:off x="4725689" y="5780841"/>
             <a:ext cx="0" cy="166315"/>
-          </a:xfrm>
-          <a:prstGeom prst="straightConnector1">
-            <a:avLst/>
-          </a:prstGeom>
-          <a:ln w="19050">
-            <a:solidFill>
-              <a:schemeClr val="tx1"/>
-            </a:solidFill>
-            <a:tailEnd type="triangle"/>
-          </a:ln>
-        </p:spPr>
-        <p:style>
-          <a:lnRef idx="1">
-            <a:schemeClr val="accent1"/>
-          </a:lnRef>
-          <a:fillRef idx="0">
-            <a:schemeClr val="accent1"/>
-          </a:fillRef>
-          <a:effectRef idx="0">
-            <a:schemeClr val="accent1"/>
-          </a:effectRef>
-          <a:fontRef idx="minor">
-            <a:schemeClr val="tx1"/>
-          </a:fontRef>
-        </p:style>
-      </p:cxnSp>
-      <p:cxnSp>
-        <p:nvCxnSpPr>
-          <p:cNvPr id="462" name="Straight Arrow Connector 461">
-            <a:extLst>
-              <a:ext uri="{FF2B5EF4-FFF2-40B4-BE49-F238E27FC236}">
-                <a16:creationId xmlns:a16="http://schemas.microsoft.com/office/drawing/2014/main" id="{09B20A2D-AB08-BB96-4DE9-503242A56DFB}"/>
-              </a:ext>
-            </a:extLst>
-          </p:cNvPr>
-          <p:cNvCxnSpPr>
-            <a:cxnSpLocks/>
-            <a:endCxn id="454" idx="0"/>
-          </p:cNvCxnSpPr>
-          <p:nvPr/>
-        </p:nvCxnSpPr>
-        <p:spPr>
-          <a:xfrm>
-            <a:off x="4852687" y="5730343"/>
-            <a:ext cx="2" cy="185237"/>
           </a:xfrm>
           <a:prstGeom prst="straightConnector1">
             <a:avLst/>
@@ -8329,13 +8451,13 @@
           <p:nvPr/>
         </p:nvCxnSpPr>
         <p:spPr>
-          <a:xfrm rot="5400000" flipH="1" flipV="1">
-            <a:off x="4020074" y="1682709"/>
-            <a:ext cx="59380" cy="1605850"/>
+          <a:xfrm rot="16200000" flipH="1">
+            <a:off x="3062410" y="1977454"/>
+            <a:ext cx="607016" cy="2719541"/>
           </a:xfrm>
           <a:prstGeom prst="curvedConnector3">
             <a:avLst>
-              <a:gd name="adj1" fmla="val 484978"/>
+              <a:gd name="adj1" fmla="val -37660"/>
             </a:avLst>
           </a:prstGeom>
           <a:ln w="28575">
@@ -8374,7 +8496,7 @@
         </p:nvSpPr>
         <p:spPr>
           <a:xfrm>
-            <a:off x="2637997" y="2515324"/>
+            <a:off x="1397306" y="3033716"/>
             <a:ext cx="1217684" cy="457200"/>
           </a:xfrm>
           <a:prstGeom prst="roundRect">
@@ -8434,15 +8556,12 @@
           <p:nvPr/>
         </p:nvCxnSpPr>
         <p:spPr>
-          <a:xfrm rot="5400000" flipH="1">
-            <a:off x="4023842" y="7231887"/>
-            <a:ext cx="686439" cy="961167"/>
-          </a:xfrm>
-          <a:prstGeom prst="curvedConnector4">
-            <a:avLst>
-              <a:gd name="adj1" fmla="val -33302"/>
-              <a:gd name="adj2" fmla="val 82576"/>
-            </a:avLst>
+          <a:xfrm rot="5400000">
+            <a:off x="4168595" y="6760639"/>
+            <a:ext cx="383681" cy="730509"/>
+          </a:xfrm>
+          <a:prstGeom prst="curvedConnector2">
+            <a:avLst/>
           </a:prstGeom>
           <a:ln w="28575">
             <a:solidFill>
@@ -8466,8 +8585,8 @@
           </a:fontRef>
         </p:style>
       </p:cxnSp>
-      <mc:AlternateContent xmlns:mc="http://schemas.openxmlformats.org/markup-compatibility/2006">
-        <mc:Choice xmlns:a14="http://schemas.microsoft.com/office/drawing/2010/main" Requires="a14">
+      <mc:AlternateContent xmlns:mc="http://schemas.openxmlformats.org/markup-compatibility/2006" xmlns:a14="http://schemas.microsoft.com/office/drawing/2010/main">
+        <mc:Choice Requires="a14">
           <p:sp>
             <p:nvSpPr>
               <p:cNvPr id="6" name="Rounded Rectangle 5">
@@ -8482,7 +8601,7 @@
             </p:nvSpPr>
             <p:spPr>
               <a:xfrm>
-                <a:off x="1502114" y="7051307"/>
+                <a:off x="1610816" y="6999791"/>
                 <a:ext cx="2384364" cy="635885"/>
               </a:xfrm>
               <a:prstGeom prst="roundRect">
@@ -8648,7 +8767,7 @@
             </p:txBody>
           </p:sp>
         </mc:Choice>
-        <mc:Fallback>
+        <mc:Fallback xmlns="">
           <p:sp>
             <p:nvSpPr>
               <p:cNvPr id="6" name="Rounded Rectangle 5">
@@ -8665,7 +8784,7 @@
             </p:nvSpPr>
             <p:spPr>
               <a:xfrm>
-                <a:off x="1502114" y="7051307"/>
+                <a:off x="1610816" y="6999791"/>
                 <a:ext cx="2384364" cy="635885"/>
               </a:xfrm>
               <a:prstGeom prst="roundRect">
@@ -8693,63 +8812,6 @@
           </p:sp>
         </mc:Fallback>
       </mc:AlternateContent>
-      <p:sp>
-        <p:nvSpPr>
-          <p:cNvPr id="8" name="Rounded Rectangle 7">
-            <a:extLst>
-              <a:ext uri="{FF2B5EF4-FFF2-40B4-BE49-F238E27FC236}">
-                <a16:creationId xmlns:a16="http://schemas.microsoft.com/office/drawing/2014/main" id="{2034A99F-8640-0261-2562-3FF310ACFA30}"/>
-              </a:ext>
-            </a:extLst>
-          </p:cNvPr>
-          <p:cNvSpPr/>
-          <p:nvPr/>
-        </p:nvSpPr>
-        <p:spPr>
-          <a:xfrm>
-            <a:off x="4226472" y="5338974"/>
-            <a:ext cx="1252433" cy="410291"/>
-          </a:xfrm>
-          <a:prstGeom prst="roundRect">
-            <a:avLst/>
-          </a:prstGeom>
-          <a:solidFill>
-            <a:schemeClr val="accent1">
-              <a:lumMod val="60000"/>
-              <a:lumOff val="40000"/>
-            </a:schemeClr>
-          </a:solidFill>
-        </p:spPr>
-        <p:style>
-          <a:lnRef idx="2">
-            <a:schemeClr val="dk1"/>
-          </a:lnRef>
-          <a:fillRef idx="1">
-            <a:schemeClr val="lt1"/>
-          </a:fillRef>
-          <a:effectRef idx="0">
-            <a:schemeClr val="dk1"/>
-          </a:effectRef>
-          <a:fontRef idx="minor">
-            <a:schemeClr val="dk1"/>
-          </a:fontRef>
-        </p:style>
-        <p:txBody>
-          <a:bodyPr rtlCol="0" anchor="ctr"/>
-          <a:lstStyle/>
-          <a:p>
-            <a:pPr algn="ctr"/>
-            <a:r>
-              <a:rPr lang="en-US" sz="1900" dirty="0" err="1"/>
-              <a:t>ReLU</a:t>
-            </a:r>
-            <a:r>
-              <a:rPr lang="en-US" sz="1900" dirty="0"/>
-              <a:t> (4)</a:t>
-            </a:r>
-          </a:p>
-        </p:txBody>
-      </p:sp>
       <p:cxnSp>
         <p:nvCxnSpPr>
           <p:cNvPr id="21" name="Straight Arrow Connector 20">
@@ -8762,13 +8824,12 @@
           <p:cNvCxnSpPr>
             <a:cxnSpLocks/>
             <a:stCxn id="62" idx="2"/>
-            <a:endCxn id="8" idx="0"/>
           </p:cNvCxnSpPr>
           <p:nvPr/>
         </p:nvCxnSpPr>
         <p:spPr>
           <a:xfrm>
-            <a:off x="4852689" y="5172659"/>
+            <a:off x="4725689" y="6357447"/>
             <a:ext cx="0" cy="166315"/>
           </a:xfrm>
           <a:prstGeom prst="straightConnector1">
@@ -8810,7 +8871,7 @@
         </p:nvSpPr>
         <p:spPr>
           <a:xfrm>
-            <a:off x="5482856" y="7687192"/>
+            <a:off x="5280465" y="7173569"/>
             <a:ext cx="768774" cy="523220"/>
           </a:xfrm>
           <a:prstGeom prst="rect">
@@ -8836,10 +8897,10 @@
       </p:sp>
       <p:sp>
         <p:nvSpPr>
-          <p:cNvPr id="2" name="Rounded Rectangle 1">
-            <a:extLst>
-              <a:ext uri="{FF2B5EF4-FFF2-40B4-BE49-F238E27FC236}">
-                <a16:creationId xmlns:a16="http://schemas.microsoft.com/office/drawing/2014/main" id="{C748B97B-BF60-D340-7E3B-C8F82CE09AA7}"/>
+          <p:cNvPr id="9" name="Rounded Rectangle 8">
+            <a:extLst>
+              <a:ext uri="{FF2B5EF4-FFF2-40B4-BE49-F238E27FC236}">
+                <a16:creationId xmlns:a16="http://schemas.microsoft.com/office/drawing/2014/main" id="{BD7C30DF-FE22-D18A-9F7D-DA989D43C6A3}"/>
               </a:ext>
             </a:extLst>
           </p:cNvPr>
@@ -8848,16 +8909,15 @@
         </p:nvSpPr>
         <p:spPr>
           <a:xfrm>
-            <a:off x="4226472" y="6492186"/>
+            <a:off x="4099472" y="6523762"/>
             <a:ext cx="1252433" cy="410291"/>
           </a:xfrm>
           <a:prstGeom prst="roundRect">
             <a:avLst/>
           </a:prstGeom>
           <a:solidFill>
-            <a:schemeClr val="accent1">
-              <a:lumMod val="60000"/>
-              <a:lumOff val="40000"/>
+            <a:schemeClr val="bg2">
+              <a:lumMod val="90000"/>
             </a:schemeClr>
           </a:solidFill>
         </p:spPr>
@@ -8890,63 +8950,17 @@
             </a:r>
             <a:r>
               <a:rPr lang="en-US" sz="1900" dirty="0"/>
-              <a:t>(4)</a:t>
-            </a:r>
-          </a:p>
-        </p:txBody>
-      </p:sp>
-      <p:cxnSp>
-        <p:nvCxnSpPr>
-          <p:cNvPr id="3" name="Straight Arrow Connector 2">
-            <a:extLst>
-              <a:ext uri="{FF2B5EF4-FFF2-40B4-BE49-F238E27FC236}">
-                <a16:creationId xmlns:a16="http://schemas.microsoft.com/office/drawing/2014/main" id="{AC5E42BD-FF26-0974-6F9C-6B33D58ABE32}"/>
-              </a:ext>
-            </a:extLst>
-          </p:cNvPr>
-          <p:cNvCxnSpPr>
-            <a:cxnSpLocks/>
-            <a:stCxn id="454" idx="2"/>
-            <a:endCxn id="2" idx="0"/>
-          </p:cNvCxnSpPr>
-          <p:nvPr/>
-        </p:nvCxnSpPr>
-        <p:spPr>
-          <a:xfrm>
-            <a:off x="4852689" y="6325871"/>
-            <a:ext cx="0" cy="166315"/>
-          </a:xfrm>
-          <a:prstGeom prst="straightConnector1">
-            <a:avLst/>
-          </a:prstGeom>
-          <a:ln w="19050">
-            <a:solidFill>
-              <a:schemeClr val="tx1"/>
-            </a:solidFill>
-            <a:tailEnd type="triangle"/>
-          </a:ln>
-        </p:spPr>
-        <p:style>
-          <a:lnRef idx="1">
-            <a:schemeClr val="accent1"/>
-          </a:lnRef>
-          <a:fillRef idx="0">
-            <a:schemeClr val="accent1"/>
-          </a:fillRef>
-          <a:effectRef idx="0">
-            <a:schemeClr val="accent1"/>
-          </a:effectRef>
-          <a:fontRef idx="minor">
-            <a:schemeClr val="tx1"/>
-          </a:fontRef>
-        </p:style>
-      </p:cxnSp>
-      <p:sp>
-        <p:nvSpPr>
-          <p:cNvPr id="5" name="Rounded Rectangle 4">
-            <a:extLst>
-              <a:ext uri="{FF2B5EF4-FFF2-40B4-BE49-F238E27FC236}">
-                <a16:creationId xmlns:a16="http://schemas.microsoft.com/office/drawing/2014/main" id="{27208855-EFF0-DF05-F1C7-9A2ADCAD491F}"/>
+              <a:t>(3)</a:t>
+            </a:r>
+          </a:p>
+        </p:txBody>
+      </p:sp>
+      <p:sp>
+        <p:nvSpPr>
+          <p:cNvPr id="13" name="Rounded Rectangle 12">
+            <a:extLst>
+              <a:ext uri="{FF2B5EF4-FFF2-40B4-BE49-F238E27FC236}">
+                <a16:creationId xmlns:a16="http://schemas.microsoft.com/office/drawing/2014/main" id="{34C26415-4074-5871-9B4B-7C837090BDA7}"/>
               </a:ext>
             </a:extLst>
           </p:cNvPr>
@@ -8955,16 +8969,16 @@
         </p:nvSpPr>
         <p:spPr>
           <a:xfrm>
-            <a:off x="4226472" y="7068792"/>
-            <a:ext cx="1252433" cy="410291"/>
+            <a:off x="2389322" y="3564186"/>
+            <a:ext cx="1567990" cy="457200"/>
           </a:xfrm>
           <a:prstGeom prst="roundRect">
             <a:avLst/>
           </a:prstGeom>
           <a:solidFill>
-            <a:schemeClr val="accent1">
-              <a:lumMod val="60000"/>
-              <a:lumOff val="40000"/>
+            <a:schemeClr val="accent6">
+              <a:lumMod val="40000"/>
+              <a:lumOff val="60000"/>
             </a:schemeClr>
           </a:solidFill>
         </p:spPr>
@@ -8989,148 +9003,38 @@
             <a:pPr algn="ctr"/>
             <a:r>
               <a:rPr lang="en-US" sz="1900" dirty="0"/>
-              <a:t>Linear</a:t>
-            </a:r>
-            <a:r>
-              <a:rPr lang="en-US" sz="1100" dirty="0"/>
-              <a:t> </a:t>
-            </a:r>
-            <a:r>
-              <a:rPr lang="en-US" sz="1900" dirty="0"/>
-              <a:t>(4)</a:t>
+              <a:t>Host Redshift</a:t>
             </a:r>
           </a:p>
         </p:txBody>
       </p:sp>
       <p:cxnSp>
         <p:nvCxnSpPr>
-          <p:cNvPr id="7" name="Straight Arrow Connector 6">
-            <a:extLst>
-              <a:ext uri="{FF2B5EF4-FFF2-40B4-BE49-F238E27FC236}">
-                <a16:creationId xmlns:a16="http://schemas.microsoft.com/office/drawing/2014/main" id="{CB4415AC-DCA2-7975-7A93-883EE46392DC}"/>
+          <p:cNvPr id="20" name="Straight Arrow Connector 37">
+            <a:extLst>
+              <a:ext uri="{FF2B5EF4-FFF2-40B4-BE49-F238E27FC236}">
+                <a16:creationId xmlns:a16="http://schemas.microsoft.com/office/drawing/2014/main" id="{6B80F047-3BF4-92CC-66A0-F7FE0EE49A81}"/>
               </a:ext>
             </a:extLst>
           </p:cNvPr>
           <p:cNvCxnSpPr>
             <a:cxnSpLocks/>
-            <a:endCxn id="5" idx="0"/>
+            <a:stCxn id="13" idx="0"/>
+            <a:endCxn id="57" idx="0"/>
           </p:cNvCxnSpPr>
           <p:nvPr/>
         </p:nvCxnSpPr>
         <p:spPr>
-          <a:xfrm>
-            <a:off x="4852687" y="6898548"/>
-            <a:ext cx="2" cy="170244"/>
-          </a:xfrm>
-          <a:prstGeom prst="straightConnector1">
-            <a:avLst/>
-          </a:prstGeom>
-          <a:ln w="19050">
-            <a:solidFill>
-              <a:schemeClr val="tx1"/>
-            </a:solidFill>
-            <a:tailEnd type="triangle"/>
-          </a:ln>
-        </p:spPr>
-        <p:style>
-          <a:lnRef idx="1">
-            <a:schemeClr val="accent1"/>
-          </a:lnRef>
-          <a:fillRef idx="0">
-            <a:schemeClr val="accent1"/>
-          </a:fillRef>
-          <a:effectRef idx="0">
-            <a:schemeClr val="accent1"/>
-          </a:effectRef>
-          <a:fontRef idx="minor">
-            <a:schemeClr val="tx1"/>
-          </a:fontRef>
-        </p:style>
-      </p:cxnSp>
-      <p:sp>
-        <p:nvSpPr>
-          <p:cNvPr id="9" name="Rounded Rectangle 8">
-            <a:extLst>
-              <a:ext uri="{FF2B5EF4-FFF2-40B4-BE49-F238E27FC236}">
-                <a16:creationId xmlns:a16="http://schemas.microsoft.com/office/drawing/2014/main" id="{BD7C30DF-FE22-D18A-9F7D-DA989D43C6A3}"/>
-              </a:ext>
-            </a:extLst>
-          </p:cNvPr>
-          <p:cNvSpPr/>
-          <p:nvPr/>
-        </p:nvSpPr>
-        <p:spPr>
-          <a:xfrm>
-            <a:off x="4221428" y="7645398"/>
-            <a:ext cx="1252433" cy="410291"/>
-          </a:xfrm>
-          <a:prstGeom prst="roundRect">
-            <a:avLst/>
-          </a:prstGeom>
-          <a:solidFill>
-            <a:schemeClr val="bg2">
-              <a:lumMod val="90000"/>
-            </a:schemeClr>
-          </a:solidFill>
-        </p:spPr>
-        <p:style>
-          <a:lnRef idx="2">
-            <a:schemeClr val="dk1"/>
-          </a:lnRef>
-          <a:fillRef idx="1">
-            <a:schemeClr val="lt1"/>
-          </a:fillRef>
-          <a:effectRef idx="0">
-            <a:schemeClr val="dk1"/>
-          </a:effectRef>
-          <a:fontRef idx="minor">
-            <a:schemeClr val="dk1"/>
-          </a:fontRef>
-        </p:style>
-        <p:txBody>
-          <a:bodyPr rtlCol="0" anchor="ctr"/>
-          <a:lstStyle/>
-          <a:p>
-            <a:pPr algn="ctr"/>
-            <a:r>
-              <a:rPr lang="en-US" sz="1900" dirty="0"/>
-              <a:t>Linear</a:t>
-            </a:r>
-            <a:r>
-              <a:rPr lang="en-US" sz="1100" dirty="0"/>
-              <a:t> </a:t>
-            </a:r>
-            <a:r>
-              <a:rPr lang="en-US" sz="1900" dirty="0"/>
-              <a:t>(3)</a:t>
-            </a:r>
-          </a:p>
-        </p:txBody>
-      </p:sp>
-      <p:cxnSp>
-        <p:nvCxnSpPr>
-          <p:cNvPr id="10" name="Straight Arrow Connector 9">
-            <a:extLst>
-              <a:ext uri="{FF2B5EF4-FFF2-40B4-BE49-F238E27FC236}">
-                <a16:creationId xmlns:a16="http://schemas.microsoft.com/office/drawing/2014/main" id="{F4C1DD23-12B1-214C-1D77-C626365A09B2}"/>
-              </a:ext>
-            </a:extLst>
-          </p:cNvPr>
-          <p:cNvCxnSpPr>
-            <a:cxnSpLocks/>
-            <a:endCxn id="9" idx="0"/>
-          </p:cNvCxnSpPr>
-          <p:nvPr/>
-        </p:nvCxnSpPr>
-        <p:spPr>
-          <a:xfrm>
-            <a:off x="4847643" y="7483000"/>
-            <a:ext cx="0" cy="162396"/>
-          </a:xfrm>
-          <a:prstGeom prst="straightConnector1">
-            <a:avLst/>
-          </a:prstGeom>
-          <a:ln w="19050">
+          <a:xfrm rot="16200000" flipH="1">
+            <a:off x="3911230" y="2826273"/>
+            <a:ext cx="76546" cy="1552372"/>
+          </a:xfrm>
+          <a:prstGeom prst="curvedConnector3">
+            <a:avLst>
+              <a:gd name="adj1" fmla="val -298644"/>
+            </a:avLst>
+          </a:prstGeom>
+          <a:ln w="28575">
             <a:solidFill>
               <a:schemeClr val="tx1"/>
             </a:solidFill>
@@ -9156,6 +9060,2630 @@
     <p:extLst>
       <p:ext uri="{BB962C8B-B14F-4D97-AF65-F5344CB8AC3E}">
         <p14:creationId xmlns:p14="http://schemas.microsoft.com/office/powerpoint/2010/main" val="1290426293"/>
+      </p:ext>
+    </p:extLst>
+  </p:cSld>
+  <p:clrMapOvr>
+    <a:masterClrMapping/>
+  </p:clrMapOvr>
+</p:sld>
+</file>
+
+<file path=ppt/slides/slide4.xml><?xml version="1.0" encoding="utf-8"?>
+<p:sld xmlns:a="http://schemas.openxmlformats.org/drawingml/2006/main" xmlns:r="http://schemas.openxmlformats.org/officeDocument/2006/relationships" xmlns:p="http://schemas.openxmlformats.org/presentationml/2006/main">
+  <p:cSld>
+    <p:spTree>
+      <p:nvGrpSpPr>
+        <p:cNvPr id="1" name="">
+          <a:extLst>
+            <a:ext uri="{FF2B5EF4-FFF2-40B4-BE49-F238E27FC236}">
+              <a16:creationId xmlns:a16="http://schemas.microsoft.com/office/drawing/2014/main" id="{1B37664B-8018-CA8D-4C36-0DC5142A7FFD}"/>
+            </a:ext>
+          </a:extLst>
+        </p:cNvPr>
+        <p:cNvGrpSpPr/>
+        <p:nvPr/>
+      </p:nvGrpSpPr>
+      <p:grpSpPr>
+        <a:xfrm>
+          <a:off x="0" y="0"/>
+          <a:ext cx="0" cy="0"/>
+          <a:chOff x="0" y="0"/>
+          <a:chExt cx="0" cy="0"/>
+        </a:xfrm>
+      </p:grpSpPr>
+      <p:grpSp>
+        <p:nvGrpSpPr>
+          <p:cNvPr id="34" name="Group 33">
+            <a:extLst>
+              <a:ext uri="{FF2B5EF4-FFF2-40B4-BE49-F238E27FC236}">
+                <a16:creationId xmlns:a16="http://schemas.microsoft.com/office/drawing/2014/main" id="{5D4A1F52-F78E-8AA6-9000-5946BD1DBD63}"/>
+              </a:ext>
+            </a:extLst>
+          </p:cNvPr>
+          <p:cNvGrpSpPr/>
+          <p:nvPr/>
+        </p:nvGrpSpPr>
+        <p:grpSpPr>
+          <a:xfrm>
+            <a:off x="2048052" y="3618752"/>
+            <a:ext cx="1823761" cy="2760673"/>
+            <a:chOff x="1705253" y="3481787"/>
+            <a:chExt cx="1823761" cy="2760673"/>
+          </a:xfrm>
+        </p:grpSpPr>
+        <p:sp>
+          <p:nvSpPr>
+            <p:cNvPr id="19" name="Rounded Rectangle 18">
+              <a:extLst>
+                <a:ext uri="{FF2B5EF4-FFF2-40B4-BE49-F238E27FC236}">
+                  <a16:creationId xmlns:a16="http://schemas.microsoft.com/office/drawing/2014/main" id="{2DFF74F9-FA5C-0EA2-ADF7-8F29E84A9D2A}"/>
+                </a:ext>
+              </a:extLst>
+            </p:cNvPr>
+            <p:cNvSpPr/>
+            <p:nvPr/>
+          </p:nvSpPr>
+          <p:spPr>
+            <a:xfrm>
+              <a:off x="1705253" y="3481787"/>
+              <a:ext cx="1823761" cy="2760673"/>
+            </a:xfrm>
+            <a:prstGeom prst="roundRect">
+              <a:avLst/>
+            </a:prstGeom>
+            <a:solidFill>
+              <a:schemeClr val="bg1">
+                <a:lumMod val="95000"/>
+              </a:schemeClr>
+            </a:solidFill>
+            <a:ln w="25400"/>
+          </p:spPr>
+          <p:style>
+            <a:lnRef idx="2">
+              <a:schemeClr val="accent1">
+                <a:shade val="15000"/>
+              </a:schemeClr>
+            </a:lnRef>
+            <a:fillRef idx="1">
+              <a:schemeClr val="accent1"/>
+            </a:fillRef>
+            <a:effectRef idx="0">
+              <a:schemeClr val="accent1"/>
+            </a:effectRef>
+            <a:fontRef idx="minor">
+              <a:schemeClr val="lt1"/>
+            </a:fontRef>
+          </p:style>
+          <p:txBody>
+            <a:bodyPr rtlCol="0" anchor="t" anchorCtr="0"/>
+            <a:lstStyle/>
+            <a:p>
+              <a:pPr algn="ctr"/>
+              <a:r>
+                <a:rPr lang="en-US" sz="3000" b="1" dirty="0">
+                  <a:solidFill>
+                    <a:schemeClr val="tx1"/>
+                  </a:solidFill>
+                </a:rPr>
+                <a:t>Legend</a:t>
+              </a:r>
+            </a:p>
+          </p:txBody>
+        </p:sp>
+        <p:sp>
+          <p:nvSpPr>
+            <p:cNvPr id="17" name="Rounded Rectangle 16">
+              <a:extLst>
+                <a:ext uri="{FF2B5EF4-FFF2-40B4-BE49-F238E27FC236}">
+                  <a16:creationId xmlns:a16="http://schemas.microsoft.com/office/drawing/2014/main" id="{DBDDF55A-328C-2C89-96D0-C46E201A4CF4}"/>
+                </a:ext>
+              </a:extLst>
+            </p:cNvPr>
+            <p:cNvSpPr/>
+            <p:nvPr/>
+          </p:nvSpPr>
+          <p:spPr>
+            <a:xfrm>
+              <a:off x="1841217" y="5366305"/>
+              <a:ext cx="1570123" cy="692425"/>
+            </a:xfrm>
+            <a:prstGeom prst="roundRect">
+              <a:avLst/>
+            </a:prstGeom>
+            <a:solidFill>
+              <a:schemeClr val="bg2">
+                <a:lumMod val="90000"/>
+              </a:schemeClr>
+            </a:solidFill>
+            <a:ln w="25400"/>
+          </p:spPr>
+          <p:style>
+            <a:lnRef idx="2">
+              <a:schemeClr val="dk1"/>
+            </a:lnRef>
+            <a:fillRef idx="1">
+              <a:schemeClr val="lt1"/>
+            </a:fillRef>
+            <a:effectRef idx="0">
+              <a:schemeClr val="dk1"/>
+            </a:effectRef>
+            <a:fontRef idx="minor">
+              <a:schemeClr val="dk1"/>
+            </a:fontRef>
+          </p:style>
+          <p:txBody>
+            <a:bodyPr rtlCol="0" anchor="ctr"/>
+            <a:lstStyle/>
+            <a:p>
+              <a:pPr algn="ctr"/>
+              <a:r>
+                <a:rPr lang="en-US" sz="1900" dirty="0"/>
+                <a:t>Input/Output Layer</a:t>
+              </a:r>
+            </a:p>
+          </p:txBody>
+        </p:sp>
+        <p:sp>
+          <p:nvSpPr>
+            <p:cNvPr id="18" name="Rounded Rectangle 17">
+              <a:extLst>
+                <a:ext uri="{FF2B5EF4-FFF2-40B4-BE49-F238E27FC236}">
+                  <a16:creationId xmlns:a16="http://schemas.microsoft.com/office/drawing/2014/main" id="{DFD7C644-0A08-8768-33D4-BA627BAB7F08}"/>
+                </a:ext>
+              </a:extLst>
+            </p:cNvPr>
+            <p:cNvSpPr/>
+            <p:nvPr/>
+          </p:nvSpPr>
+          <p:spPr>
+            <a:xfrm>
+              <a:off x="1821091" y="4795133"/>
+              <a:ext cx="1570123" cy="432081"/>
+            </a:xfrm>
+            <a:prstGeom prst="roundRect">
+              <a:avLst/>
+            </a:prstGeom>
+            <a:solidFill>
+              <a:schemeClr val="accent1">
+                <a:lumMod val="60000"/>
+                <a:lumOff val="40000"/>
+              </a:schemeClr>
+            </a:solidFill>
+            <a:ln w="25400"/>
+          </p:spPr>
+          <p:style>
+            <a:lnRef idx="2">
+              <a:schemeClr val="dk1"/>
+            </a:lnRef>
+            <a:fillRef idx="1">
+              <a:schemeClr val="lt1"/>
+            </a:fillRef>
+            <a:effectRef idx="0">
+              <a:schemeClr val="dk1"/>
+            </a:effectRef>
+            <a:fontRef idx="minor">
+              <a:schemeClr val="dk1"/>
+            </a:fontRef>
+          </p:style>
+          <p:txBody>
+            <a:bodyPr rtlCol="0" anchor="ctr"/>
+            <a:lstStyle/>
+            <a:p>
+              <a:pPr algn="ctr"/>
+              <a:r>
+                <a:rPr lang="en-US" sz="1900" dirty="0"/>
+                <a:t>Hidden Layer</a:t>
+              </a:r>
+            </a:p>
+          </p:txBody>
+        </p:sp>
+        <p:sp>
+          <p:nvSpPr>
+            <p:cNvPr id="58" name="Rounded Rectangle 57">
+              <a:extLst>
+                <a:ext uri="{FF2B5EF4-FFF2-40B4-BE49-F238E27FC236}">
+                  <a16:creationId xmlns:a16="http://schemas.microsoft.com/office/drawing/2014/main" id="{D1B67229-FFDA-5B81-6E53-C193A8002B1C}"/>
+                </a:ext>
+              </a:extLst>
+            </p:cNvPr>
+            <p:cNvSpPr/>
+            <p:nvPr/>
+          </p:nvSpPr>
+          <p:spPr>
+            <a:xfrm>
+              <a:off x="1791129" y="4219797"/>
+              <a:ext cx="1656517" cy="432081"/>
+            </a:xfrm>
+            <a:prstGeom prst="roundRect">
+              <a:avLst/>
+            </a:prstGeom>
+            <a:solidFill>
+              <a:schemeClr val="accent6">
+                <a:lumMod val="40000"/>
+                <a:lumOff val="60000"/>
+              </a:schemeClr>
+            </a:solidFill>
+            <a:ln w="25400"/>
+          </p:spPr>
+          <p:style>
+            <a:lnRef idx="2">
+              <a:schemeClr val="dk1"/>
+            </a:lnRef>
+            <a:fillRef idx="1">
+              <a:schemeClr val="lt1"/>
+            </a:fillRef>
+            <a:effectRef idx="0">
+              <a:schemeClr val="dk1"/>
+            </a:effectRef>
+            <a:fontRef idx="minor">
+              <a:schemeClr val="dk1"/>
+            </a:fontRef>
+          </p:style>
+          <p:txBody>
+            <a:bodyPr rtlCol="0" anchor="ctr"/>
+            <a:lstStyle/>
+            <a:p>
+              <a:pPr algn="ctr"/>
+              <a:r>
+                <a:rPr lang="en-US" sz="1900" dirty="0"/>
+                <a:t>Physical Value</a:t>
+              </a:r>
+            </a:p>
+          </p:txBody>
+        </p:sp>
+      </p:grpSp>
+      <p:sp>
+        <p:nvSpPr>
+          <p:cNvPr id="57" name="Rounded Rectangle 56">
+            <a:extLst>
+              <a:ext uri="{FF2B5EF4-FFF2-40B4-BE49-F238E27FC236}">
+                <a16:creationId xmlns:a16="http://schemas.microsoft.com/office/drawing/2014/main" id="{E88F3971-F977-92CA-E19B-BF456E08E5BB}"/>
+              </a:ext>
+            </a:extLst>
+          </p:cNvPr>
+          <p:cNvSpPr/>
+          <p:nvPr/>
+        </p:nvSpPr>
+        <p:spPr>
+          <a:xfrm>
+            <a:off x="4099472" y="3640732"/>
+            <a:ext cx="1252433" cy="410291"/>
+          </a:xfrm>
+          <a:prstGeom prst="roundRect">
+            <a:avLst/>
+          </a:prstGeom>
+          <a:solidFill>
+            <a:schemeClr val="bg2">
+              <a:lumMod val="90000"/>
+            </a:schemeClr>
+          </a:solidFill>
+        </p:spPr>
+        <p:style>
+          <a:lnRef idx="2">
+            <a:schemeClr val="dk1"/>
+          </a:lnRef>
+          <a:fillRef idx="1">
+            <a:schemeClr val="lt1"/>
+          </a:fillRef>
+          <a:effectRef idx="0">
+            <a:schemeClr val="dk1"/>
+          </a:effectRef>
+          <a:fontRef idx="minor">
+            <a:schemeClr val="dk1"/>
+          </a:fontRef>
+        </p:style>
+        <p:txBody>
+          <a:bodyPr rtlCol="0" anchor="ctr"/>
+          <a:lstStyle/>
+          <a:p>
+            <a:pPr algn="ctr"/>
+            <a:r>
+              <a:rPr lang="en-US" sz="1900" dirty="0"/>
+              <a:t>Input (6)</a:t>
+            </a:r>
+          </a:p>
+        </p:txBody>
+      </p:sp>
+      <p:sp>
+        <p:nvSpPr>
+          <p:cNvPr id="59" name="Rounded Rectangle 58">
+            <a:extLst>
+              <a:ext uri="{FF2B5EF4-FFF2-40B4-BE49-F238E27FC236}">
+                <a16:creationId xmlns:a16="http://schemas.microsoft.com/office/drawing/2014/main" id="{847C4917-AF01-760D-5D89-BC59181E6EF1}"/>
+              </a:ext>
+            </a:extLst>
+          </p:cNvPr>
+          <p:cNvSpPr/>
+          <p:nvPr/>
+        </p:nvSpPr>
+        <p:spPr>
+          <a:xfrm>
+            <a:off x="4099472" y="4217338"/>
+            <a:ext cx="1252433" cy="410291"/>
+          </a:xfrm>
+          <a:prstGeom prst="roundRect">
+            <a:avLst/>
+          </a:prstGeom>
+          <a:solidFill>
+            <a:schemeClr val="accent1">
+              <a:lumMod val="60000"/>
+              <a:lumOff val="40000"/>
+            </a:schemeClr>
+          </a:solidFill>
+        </p:spPr>
+        <p:style>
+          <a:lnRef idx="2">
+            <a:schemeClr val="dk1"/>
+          </a:lnRef>
+          <a:fillRef idx="1">
+            <a:schemeClr val="lt1"/>
+          </a:fillRef>
+          <a:effectRef idx="0">
+            <a:schemeClr val="dk1"/>
+          </a:effectRef>
+          <a:fontRef idx="minor">
+            <a:schemeClr val="dk1"/>
+          </a:fontRef>
+        </p:style>
+        <p:txBody>
+          <a:bodyPr rtlCol="0" anchor="ctr"/>
+          <a:lstStyle/>
+          <a:p>
+            <a:pPr algn="ctr"/>
+            <a:r>
+              <a:rPr lang="en-US" sz="1900" dirty="0" err="1"/>
+              <a:t>ReLU</a:t>
+            </a:r>
+            <a:r>
+              <a:rPr lang="en-US" sz="1900" dirty="0"/>
+              <a:t> (6)</a:t>
+            </a:r>
+          </a:p>
+        </p:txBody>
+      </p:sp>
+      <p:sp>
+        <p:nvSpPr>
+          <p:cNvPr id="60" name="Rounded Rectangle 59">
+            <a:extLst>
+              <a:ext uri="{FF2B5EF4-FFF2-40B4-BE49-F238E27FC236}">
+                <a16:creationId xmlns:a16="http://schemas.microsoft.com/office/drawing/2014/main" id="{55CF2814-8D53-8F4F-95C1-544833601282}"/>
+              </a:ext>
+            </a:extLst>
+          </p:cNvPr>
+          <p:cNvSpPr/>
+          <p:nvPr/>
+        </p:nvSpPr>
+        <p:spPr>
+          <a:xfrm>
+            <a:off x="4099472" y="4793944"/>
+            <a:ext cx="1252433" cy="410291"/>
+          </a:xfrm>
+          <a:prstGeom prst="roundRect">
+            <a:avLst/>
+          </a:prstGeom>
+          <a:solidFill>
+            <a:schemeClr val="accent1">
+              <a:lumMod val="60000"/>
+              <a:lumOff val="40000"/>
+            </a:schemeClr>
+          </a:solidFill>
+        </p:spPr>
+        <p:style>
+          <a:lnRef idx="2">
+            <a:schemeClr val="dk1"/>
+          </a:lnRef>
+          <a:fillRef idx="1">
+            <a:schemeClr val="lt1"/>
+          </a:fillRef>
+          <a:effectRef idx="0">
+            <a:schemeClr val="dk1"/>
+          </a:effectRef>
+          <a:fontRef idx="minor">
+            <a:schemeClr val="dk1"/>
+          </a:fontRef>
+        </p:style>
+        <p:txBody>
+          <a:bodyPr rtlCol="0" anchor="ctr"/>
+          <a:lstStyle/>
+          <a:p>
+            <a:pPr algn="ctr"/>
+            <a:r>
+              <a:rPr lang="en-US" sz="1900" dirty="0" err="1"/>
+              <a:t>ReLU</a:t>
+            </a:r>
+            <a:r>
+              <a:rPr lang="en-US" sz="1900" dirty="0"/>
+              <a:t> (5)</a:t>
+            </a:r>
+          </a:p>
+        </p:txBody>
+      </p:sp>
+      <p:sp>
+        <p:nvSpPr>
+          <p:cNvPr id="61" name="Rounded Rectangle 60">
+            <a:extLst>
+              <a:ext uri="{FF2B5EF4-FFF2-40B4-BE49-F238E27FC236}">
+                <a16:creationId xmlns:a16="http://schemas.microsoft.com/office/drawing/2014/main" id="{D1CD627D-F85E-D217-610F-1CC770C1FC8A}"/>
+              </a:ext>
+            </a:extLst>
+          </p:cNvPr>
+          <p:cNvSpPr/>
+          <p:nvPr/>
+        </p:nvSpPr>
+        <p:spPr>
+          <a:xfrm>
+            <a:off x="4099472" y="5370550"/>
+            <a:ext cx="1252433" cy="410291"/>
+          </a:xfrm>
+          <a:prstGeom prst="roundRect">
+            <a:avLst/>
+          </a:prstGeom>
+          <a:solidFill>
+            <a:schemeClr val="accent1">
+              <a:lumMod val="60000"/>
+              <a:lumOff val="40000"/>
+            </a:schemeClr>
+          </a:solidFill>
+        </p:spPr>
+        <p:style>
+          <a:lnRef idx="2">
+            <a:schemeClr val="dk1"/>
+          </a:lnRef>
+          <a:fillRef idx="1">
+            <a:schemeClr val="lt1"/>
+          </a:fillRef>
+          <a:effectRef idx="0">
+            <a:schemeClr val="dk1"/>
+          </a:effectRef>
+          <a:fontRef idx="minor">
+            <a:schemeClr val="dk1"/>
+          </a:fontRef>
+        </p:style>
+        <p:txBody>
+          <a:bodyPr rtlCol="0" anchor="ctr"/>
+          <a:lstStyle/>
+          <a:p>
+            <a:pPr algn="ctr"/>
+            <a:r>
+              <a:rPr lang="en-US" sz="1900" dirty="0" err="1"/>
+              <a:t>ReLU</a:t>
+            </a:r>
+            <a:r>
+              <a:rPr lang="en-US" sz="1900" dirty="0"/>
+              <a:t> (4)</a:t>
+            </a:r>
+          </a:p>
+        </p:txBody>
+      </p:sp>
+      <p:sp>
+        <p:nvSpPr>
+          <p:cNvPr id="62" name="Rounded Rectangle 61">
+            <a:extLst>
+              <a:ext uri="{FF2B5EF4-FFF2-40B4-BE49-F238E27FC236}">
+                <a16:creationId xmlns:a16="http://schemas.microsoft.com/office/drawing/2014/main" id="{DCAFA8DE-34D9-4D22-75B8-AB5BD64E6624}"/>
+              </a:ext>
+            </a:extLst>
+          </p:cNvPr>
+          <p:cNvSpPr/>
+          <p:nvPr/>
+        </p:nvSpPr>
+        <p:spPr>
+          <a:xfrm>
+            <a:off x="4099472" y="5947156"/>
+            <a:ext cx="1252433" cy="410291"/>
+          </a:xfrm>
+          <a:prstGeom prst="roundRect">
+            <a:avLst/>
+          </a:prstGeom>
+          <a:solidFill>
+            <a:schemeClr val="accent1">
+              <a:lumMod val="60000"/>
+              <a:lumOff val="40000"/>
+            </a:schemeClr>
+          </a:solidFill>
+        </p:spPr>
+        <p:style>
+          <a:lnRef idx="2">
+            <a:schemeClr val="dk1"/>
+          </a:lnRef>
+          <a:fillRef idx="1">
+            <a:schemeClr val="lt1"/>
+          </a:fillRef>
+          <a:effectRef idx="0">
+            <a:schemeClr val="dk1"/>
+          </a:effectRef>
+          <a:fontRef idx="minor">
+            <a:schemeClr val="dk1"/>
+          </a:fontRef>
+        </p:style>
+        <p:txBody>
+          <a:bodyPr rtlCol="0" anchor="ctr"/>
+          <a:lstStyle/>
+          <a:p>
+            <a:pPr algn="ctr"/>
+            <a:r>
+              <a:rPr lang="en-US" sz="1900" dirty="0" err="1"/>
+              <a:t>ReLU</a:t>
+            </a:r>
+            <a:r>
+              <a:rPr lang="en-US" sz="1900" dirty="0"/>
+              <a:t> (3)</a:t>
+            </a:r>
+          </a:p>
+        </p:txBody>
+      </p:sp>
+      <p:cxnSp>
+        <p:nvCxnSpPr>
+          <p:cNvPr id="455" name="Straight Arrow Connector 454">
+            <a:extLst>
+              <a:ext uri="{FF2B5EF4-FFF2-40B4-BE49-F238E27FC236}">
+                <a16:creationId xmlns:a16="http://schemas.microsoft.com/office/drawing/2014/main" id="{578F379B-2252-0577-3857-010599869517}"/>
+              </a:ext>
+            </a:extLst>
+          </p:cNvPr>
+          <p:cNvCxnSpPr>
+            <a:cxnSpLocks/>
+            <a:stCxn id="57" idx="2"/>
+            <a:endCxn id="59" idx="0"/>
+          </p:cNvCxnSpPr>
+          <p:nvPr/>
+        </p:nvCxnSpPr>
+        <p:spPr>
+          <a:xfrm>
+            <a:off x="4725689" y="4051023"/>
+            <a:ext cx="0" cy="166315"/>
+          </a:xfrm>
+          <a:prstGeom prst="straightConnector1">
+            <a:avLst/>
+          </a:prstGeom>
+          <a:ln w="19050">
+            <a:solidFill>
+              <a:schemeClr val="tx1"/>
+            </a:solidFill>
+            <a:tailEnd type="triangle"/>
+          </a:ln>
+        </p:spPr>
+        <p:style>
+          <a:lnRef idx="1">
+            <a:schemeClr val="accent1"/>
+          </a:lnRef>
+          <a:fillRef idx="0">
+            <a:schemeClr val="accent1"/>
+          </a:fillRef>
+          <a:effectRef idx="0">
+            <a:schemeClr val="accent1"/>
+          </a:effectRef>
+          <a:fontRef idx="minor">
+            <a:schemeClr val="tx1"/>
+          </a:fontRef>
+        </p:style>
+      </p:cxnSp>
+      <p:cxnSp>
+        <p:nvCxnSpPr>
+          <p:cNvPr id="456" name="Straight Arrow Connector 455">
+            <a:extLst>
+              <a:ext uri="{FF2B5EF4-FFF2-40B4-BE49-F238E27FC236}">
+                <a16:creationId xmlns:a16="http://schemas.microsoft.com/office/drawing/2014/main" id="{809C75E1-FEDA-C204-4A19-53F61221EB44}"/>
+              </a:ext>
+            </a:extLst>
+          </p:cNvPr>
+          <p:cNvCxnSpPr>
+            <a:cxnSpLocks/>
+            <a:stCxn id="59" idx="2"/>
+            <a:endCxn id="60" idx="0"/>
+          </p:cNvCxnSpPr>
+          <p:nvPr/>
+        </p:nvCxnSpPr>
+        <p:spPr>
+          <a:xfrm>
+            <a:off x="4725689" y="4627629"/>
+            <a:ext cx="0" cy="166315"/>
+          </a:xfrm>
+          <a:prstGeom prst="straightConnector1">
+            <a:avLst/>
+          </a:prstGeom>
+          <a:ln w="19050">
+            <a:solidFill>
+              <a:schemeClr val="tx1"/>
+            </a:solidFill>
+            <a:tailEnd type="triangle"/>
+          </a:ln>
+        </p:spPr>
+        <p:style>
+          <a:lnRef idx="1">
+            <a:schemeClr val="accent1"/>
+          </a:lnRef>
+          <a:fillRef idx="0">
+            <a:schemeClr val="accent1"/>
+          </a:fillRef>
+          <a:effectRef idx="0">
+            <a:schemeClr val="accent1"/>
+          </a:effectRef>
+          <a:fontRef idx="minor">
+            <a:schemeClr val="tx1"/>
+          </a:fontRef>
+        </p:style>
+      </p:cxnSp>
+      <p:cxnSp>
+        <p:nvCxnSpPr>
+          <p:cNvPr id="457" name="Straight Arrow Connector 456">
+            <a:extLst>
+              <a:ext uri="{FF2B5EF4-FFF2-40B4-BE49-F238E27FC236}">
+                <a16:creationId xmlns:a16="http://schemas.microsoft.com/office/drawing/2014/main" id="{5E2AF9DC-A4DF-0074-2FEC-B0CA1816BFB9}"/>
+              </a:ext>
+            </a:extLst>
+          </p:cNvPr>
+          <p:cNvCxnSpPr>
+            <a:cxnSpLocks/>
+            <a:stCxn id="60" idx="2"/>
+            <a:endCxn id="61" idx="0"/>
+          </p:cNvCxnSpPr>
+          <p:nvPr/>
+        </p:nvCxnSpPr>
+        <p:spPr>
+          <a:xfrm>
+            <a:off x="4725689" y="5204235"/>
+            <a:ext cx="0" cy="166315"/>
+          </a:xfrm>
+          <a:prstGeom prst="straightConnector1">
+            <a:avLst/>
+          </a:prstGeom>
+          <a:ln w="19050">
+            <a:solidFill>
+              <a:schemeClr val="tx1"/>
+            </a:solidFill>
+            <a:tailEnd type="triangle"/>
+          </a:ln>
+        </p:spPr>
+        <p:style>
+          <a:lnRef idx="1">
+            <a:schemeClr val="accent1"/>
+          </a:lnRef>
+          <a:fillRef idx="0">
+            <a:schemeClr val="accent1"/>
+          </a:fillRef>
+          <a:effectRef idx="0">
+            <a:schemeClr val="accent1"/>
+          </a:effectRef>
+          <a:fontRef idx="minor">
+            <a:schemeClr val="tx1"/>
+          </a:fontRef>
+        </p:style>
+      </p:cxnSp>
+      <p:cxnSp>
+        <p:nvCxnSpPr>
+          <p:cNvPr id="458" name="Straight Arrow Connector 457">
+            <a:extLst>
+              <a:ext uri="{FF2B5EF4-FFF2-40B4-BE49-F238E27FC236}">
+                <a16:creationId xmlns:a16="http://schemas.microsoft.com/office/drawing/2014/main" id="{504A19F5-FDA9-1C87-F83C-A6B84EA23146}"/>
+              </a:ext>
+            </a:extLst>
+          </p:cNvPr>
+          <p:cNvCxnSpPr>
+            <a:cxnSpLocks/>
+            <a:stCxn id="61" idx="2"/>
+            <a:endCxn id="62" idx="0"/>
+          </p:cNvCxnSpPr>
+          <p:nvPr/>
+        </p:nvCxnSpPr>
+        <p:spPr>
+          <a:xfrm>
+            <a:off x="4725689" y="5780841"/>
+            <a:ext cx="0" cy="166315"/>
+          </a:xfrm>
+          <a:prstGeom prst="straightConnector1">
+            <a:avLst/>
+          </a:prstGeom>
+          <a:ln w="19050">
+            <a:solidFill>
+              <a:schemeClr val="tx1"/>
+            </a:solidFill>
+            <a:tailEnd type="triangle"/>
+          </a:ln>
+        </p:spPr>
+        <p:style>
+          <a:lnRef idx="1">
+            <a:schemeClr val="accent1"/>
+          </a:lnRef>
+          <a:fillRef idx="0">
+            <a:schemeClr val="accent1"/>
+          </a:fillRef>
+          <a:effectRef idx="0">
+            <a:schemeClr val="accent1"/>
+          </a:effectRef>
+          <a:fontRef idx="minor">
+            <a:schemeClr val="tx1"/>
+          </a:fontRef>
+        </p:style>
+      </p:cxnSp>
+      <p:cxnSp>
+        <p:nvCxnSpPr>
+          <p:cNvPr id="464" name="Straight Arrow Connector 37">
+            <a:extLst>
+              <a:ext uri="{FF2B5EF4-FFF2-40B4-BE49-F238E27FC236}">
+                <a16:creationId xmlns:a16="http://schemas.microsoft.com/office/drawing/2014/main" id="{C76D4A5B-8F0A-F021-8CC4-56CC9FB64D61}"/>
+              </a:ext>
+            </a:extLst>
+          </p:cNvPr>
+          <p:cNvCxnSpPr>
+            <a:cxnSpLocks/>
+            <a:stCxn id="467" idx="2"/>
+            <a:endCxn id="57" idx="0"/>
+          </p:cNvCxnSpPr>
+          <p:nvPr/>
+        </p:nvCxnSpPr>
+        <p:spPr>
+          <a:xfrm rot="16200000" flipH="1">
+            <a:off x="4042671" y="2957714"/>
+            <a:ext cx="193010" cy="1173025"/>
+          </a:xfrm>
+          <a:prstGeom prst="curvedConnector3">
+            <a:avLst>
+              <a:gd name="adj1" fmla="val 50000"/>
+            </a:avLst>
+          </a:prstGeom>
+          <a:ln w="28575">
+            <a:solidFill>
+              <a:schemeClr val="tx1"/>
+            </a:solidFill>
+            <a:tailEnd type="triangle"/>
+          </a:ln>
+        </p:spPr>
+        <p:style>
+          <a:lnRef idx="1">
+            <a:schemeClr val="accent1"/>
+          </a:lnRef>
+          <a:fillRef idx="0">
+            <a:schemeClr val="accent1"/>
+          </a:fillRef>
+          <a:effectRef idx="0">
+            <a:schemeClr val="accent1"/>
+          </a:effectRef>
+          <a:fontRef idx="minor">
+            <a:schemeClr val="tx1"/>
+          </a:fontRef>
+        </p:style>
+      </p:cxnSp>
+      <p:sp>
+        <p:nvSpPr>
+          <p:cNvPr id="467" name="Rounded Rectangle 466">
+            <a:extLst>
+              <a:ext uri="{FF2B5EF4-FFF2-40B4-BE49-F238E27FC236}">
+                <a16:creationId xmlns:a16="http://schemas.microsoft.com/office/drawing/2014/main" id="{CECE45E6-96F8-37BB-B165-EB4196EF3C16}"/>
+              </a:ext>
+            </a:extLst>
+          </p:cNvPr>
+          <p:cNvSpPr/>
+          <p:nvPr/>
+        </p:nvSpPr>
+        <p:spPr>
+          <a:xfrm>
+            <a:off x="2943822" y="3037430"/>
+            <a:ext cx="1217684" cy="410292"/>
+          </a:xfrm>
+          <a:prstGeom prst="roundRect">
+            <a:avLst/>
+          </a:prstGeom>
+          <a:solidFill>
+            <a:schemeClr val="accent6">
+              <a:lumMod val="40000"/>
+              <a:lumOff val="60000"/>
+            </a:schemeClr>
+          </a:solidFill>
+        </p:spPr>
+        <p:style>
+          <a:lnRef idx="2">
+            <a:schemeClr val="dk1"/>
+          </a:lnRef>
+          <a:fillRef idx="1">
+            <a:schemeClr val="lt1"/>
+          </a:fillRef>
+          <a:effectRef idx="0">
+            <a:schemeClr val="dk1"/>
+          </a:effectRef>
+          <a:fontRef idx="minor">
+            <a:schemeClr val="dk1"/>
+          </a:fontRef>
+        </p:style>
+        <p:txBody>
+          <a:bodyPr rtlCol="0" anchor="ctr"/>
+          <a:lstStyle/>
+          <a:p>
+            <a:pPr algn="ctr"/>
+            <a:r>
+              <a:rPr lang="en-US" sz="1900" dirty="0"/>
+              <a:t>Host </a:t>
+            </a:r>
+            <a:r>
+              <a:rPr lang="en-US" sz="1900" i="1" dirty="0"/>
+              <a:t>grizy</a:t>
+            </a:r>
+          </a:p>
+        </p:txBody>
+      </p:sp>
+      <p:cxnSp>
+        <p:nvCxnSpPr>
+          <p:cNvPr id="486" name="Curved Connector 485">
+            <a:extLst>
+              <a:ext uri="{FF2B5EF4-FFF2-40B4-BE49-F238E27FC236}">
+                <a16:creationId xmlns:a16="http://schemas.microsoft.com/office/drawing/2014/main" id="{3E1D827A-9116-3863-4C07-386EA7DC9C2B}"/>
+              </a:ext>
+            </a:extLst>
+          </p:cNvPr>
+          <p:cNvCxnSpPr>
+            <a:cxnSpLocks/>
+            <a:stCxn id="9" idx="2"/>
+            <a:endCxn id="6" idx="0"/>
+          </p:cNvCxnSpPr>
+          <p:nvPr/>
+        </p:nvCxnSpPr>
+        <p:spPr>
+          <a:xfrm rot="16200000" flipH="1">
+            <a:off x="4644815" y="7014927"/>
+            <a:ext cx="166315" cy="4566"/>
+          </a:xfrm>
+          <a:prstGeom prst="curvedConnector3">
+            <a:avLst>
+              <a:gd name="adj1" fmla="val 50000"/>
+            </a:avLst>
+          </a:prstGeom>
+          <a:ln w="28575">
+            <a:solidFill>
+              <a:schemeClr val="tx1"/>
+            </a:solidFill>
+            <a:tailEnd type="triangle"/>
+          </a:ln>
+        </p:spPr>
+        <p:style>
+          <a:lnRef idx="1">
+            <a:schemeClr val="accent1"/>
+          </a:lnRef>
+          <a:fillRef idx="0">
+            <a:schemeClr val="accent1"/>
+          </a:fillRef>
+          <a:effectRef idx="0">
+            <a:schemeClr val="accent1"/>
+          </a:effectRef>
+          <a:fontRef idx="minor">
+            <a:schemeClr val="tx1"/>
+          </a:fontRef>
+        </p:style>
+      </p:cxnSp>
+      <mc:AlternateContent xmlns:mc="http://schemas.openxmlformats.org/markup-compatibility/2006" xmlns:a14="http://schemas.microsoft.com/office/drawing/2010/main">
+        <mc:Choice Requires="a14">
+          <p:sp>
+            <p:nvSpPr>
+              <p:cNvPr id="6" name="Rounded Rectangle 5">
+                <a:extLst>
+                  <a:ext uri="{FF2B5EF4-FFF2-40B4-BE49-F238E27FC236}">
+                    <a16:creationId xmlns:a16="http://schemas.microsoft.com/office/drawing/2014/main" id="{6C865D0E-93A2-336C-BED0-C88257B6D91E}"/>
+                  </a:ext>
+                </a:extLst>
+              </p:cNvPr>
+              <p:cNvSpPr/>
+              <p:nvPr/>
+            </p:nvSpPr>
+            <p:spPr>
+              <a:xfrm>
+                <a:off x="3683395" y="7100368"/>
+                <a:ext cx="2093719" cy="635885"/>
+              </a:xfrm>
+              <a:prstGeom prst="roundRect">
+                <a:avLst/>
+              </a:prstGeom>
+              <a:solidFill>
+                <a:schemeClr val="accent6">
+                  <a:lumMod val="40000"/>
+                  <a:lumOff val="60000"/>
+                </a:schemeClr>
+              </a:solidFill>
+            </p:spPr>
+            <p:style>
+              <a:lnRef idx="2">
+                <a:schemeClr val="dk1"/>
+              </a:lnRef>
+              <a:fillRef idx="1">
+                <a:schemeClr val="lt1"/>
+              </a:fillRef>
+              <a:effectRef idx="0">
+                <a:schemeClr val="dk1"/>
+              </a:effectRef>
+              <a:fontRef idx="minor">
+                <a:schemeClr val="dk1"/>
+              </a:fontRef>
+            </p:style>
+            <p:txBody>
+              <a:bodyPr rtlCol="0" anchor="ctr"/>
+              <a:lstStyle/>
+              <a:p>
+                <a:pPr algn="ctr"/>
+                <a:r>
+                  <a:rPr lang="en-US" sz="1900" dirty="0"/>
+                  <a:t>Host Properties</a:t>
+                </a:r>
+              </a:p>
+              <a:p>
+                <a:pPr algn="ctr"/>
+                <a:r>
+                  <a:rPr lang="en-US" sz="1900" dirty="0"/>
+                  <a:t>[</a:t>
+                </a:r>
+                <a14:m>
+                  <m:oMath xmlns:m="http://schemas.openxmlformats.org/officeDocument/2006/math">
+                    <m:func>
+                      <m:funcPr>
+                        <m:ctrlPr>
+                          <a:rPr lang="en-US" sz="1900" b="0" i="1" smtClean="0">
+                            <a:latin typeface="Cambria Math" panose="02040503050406030204" pitchFamily="18" charset="0"/>
+                          </a:rPr>
+                        </m:ctrlPr>
+                      </m:funcPr>
+                      <m:fName>
+                        <m:r>
+                          <m:rPr>
+                            <m:sty m:val="p"/>
+                          </m:rPr>
+                          <a:rPr lang="en-US" sz="1900" b="0" i="0" smtClean="0">
+                            <a:latin typeface="Cambria Math" panose="02040503050406030204" pitchFamily="18" charset="0"/>
+                          </a:rPr>
+                          <m:t>log</m:t>
+                        </m:r>
+                      </m:fName>
+                      <m:e>
+                        <m:sSub>
+                          <m:sSubPr>
+                            <m:ctrlPr>
+                              <a:rPr lang="en-US" sz="1900" b="0" i="1" smtClean="0">
+                                <a:latin typeface="Cambria Math" panose="02040503050406030204" pitchFamily="18" charset="0"/>
+                              </a:rPr>
+                            </m:ctrlPr>
+                          </m:sSubPr>
+                          <m:e>
+                            <m:r>
+                              <a:rPr lang="en-US" sz="1900" b="0" i="1" smtClean="0">
+                                <a:latin typeface="Cambria Math" panose="02040503050406030204" pitchFamily="18" charset="0"/>
+                              </a:rPr>
+                              <m:t>𝑀</m:t>
+                            </m:r>
+                          </m:e>
+                          <m:sub>
+                            <m:r>
+                              <a:rPr lang="en-US" sz="1900" b="0" i="1" smtClean="0">
+                                <a:latin typeface="Cambria Math" panose="02040503050406030204" pitchFamily="18" charset="0"/>
+                              </a:rPr>
+                              <m:t>∗</m:t>
+                            </m:r>
+                          </m:sub>
+                        </m:sSub>
+                      </m:e>
+                    </m:func>
+                    <m:r>
+                      <a:rPr lang="en-US" sz="1900" b="0" i="1" smtClean="0">
+                        <a:latin typeface="Cambria Math" panose="02040503050406030204" pitchFamily="18" charset="0"/>
+                      </a:rPr>
+                      <m:t>,</m:t>
+                    </m:r>
+                    <m:func>
+                      <m:funcPr>
+                        <m:ctrlPr>
+                          <a:rPr lang="en-US" sz="1900" b="0" i="1" smtClean="0">
+                            <a:latin typeface="Cambria Math" panose="02040503050406030204" pitchFamily="18" charset="0"/>
+                          </a:rPr>
+                        </m:ctrlPr>
+                      </m:funcPr>
+                      <m:fName>
+                        <m:r>
+                          <m:rPr>
+                            <m:sty m:val="p"/>
+                          </m:rPr>
+                          <a:rPr lang="en-US" sz="1900" b="0" i="0" smtClean="0">
+                            <a:latin typeface="Cambria Math" panose="02040503050406030204" pitchFamily="18" charset="0"/>
+                          </a:rPr>
+                          <m:t>log</m:t>
+                        </m:r>
+                      </m:fName>
+                      <m:e>
+                        <m:r>
+                          <a:rPr lang="en-US" sz="1900" b="0" i="1" smtClean="0">
+                            <a:latin typeface="Cambria Math" panose="02040503050406030204" pitchFamily="18" charset="0"/>
+                          </a:rPr>
+                          <m:t>(</m:t>
+                        </m:r>
+                        <m:r>
+                          <m:rPr>
+                            <m:sty m:val="p"/>
+                          </m:rPr>
+                          <a:rPr lang="en-US" sz="1900" b="0" i="0" smtClean="0">
+                            <a:latin typeface="Cambria Math" panose="02040503050406030204" pitchFamily="18" charset="0"/>
+                          </a:rPr>
+                          <m:t>SFR</m:t>
+                        </m:r>
+                        <m:r>
+                          <a:rPr lang="en-US" sz="1900" b="0" i="1" smtClean="0">
+                            <a:latin typeface="Cambria Math" panose="02040503050406030204" pitchFamily="18" charset="0"/>
+                          </a:rPr>
+                          <m:t>)</m:t>
+                        </m:r>
+                      </m:e>
+                    </m:func>
+                  </m:oMath>
+                </a14:m>
+                <a:r>
+                  <a:rPr lang="en-US" sz="1900" dirty="0"/>
+                  <a:t>]</a:t>
+                </a:r>
+              </a:p>
+            </p:txBody>
+          </p:sp>
+        </mc:Choice>
+        <mc:Fallback xmlns="">
+          <p:sp>
+            <p:nvSpPr>
+              <p:cNvPr id="6" name="Rounded Rectangle 5">
+                <a:extLst>
+                  <a:ext uri="{FF2B5EF4-FFF2-40B4-BE49-F238E27FC236}">
+                    <a16:creationId xmlns:a16="http://schemas.microsoft.com/office/drawing/2014/main" id="{6C865D0E-93A2-336C-BED0-C88257B6D91E}"/>
+                  </a:ext>
+                </a:extLst>
+              </p:cNvPr>
+              <p:cNvSpPr>
+                <a:spLocks noRot="1" noChangeAspect="1" noMove="1" noResize="1" noEditPoints="1" noAdjustHandles="1" noChangeArrowheads="1" noChangeShapeType="1" noTextEdit="1"/>
+              </p:cNvSpPr>
+              <p:nvPr/>
+            </p:nvSpPr>
+            <p:spPr>
+              <a:xfrm>
+                <a:off x="3683395" y="7100368"/>
+                <a:ext cx="2093719" cy="635885"/>
+              </a:xfrm>
+              <a:prstGeom prst="roundRect">
+                <a:avLst/>
+              </a:prstGeom>
+              <a:blipFill>
+                <a:blip r:embed="rId3"/>
+                <a:stretch>
+                  <a:fillRect l="-599" t="-5769" r="-599" b="-19231"/>
+                </a:stretch>
+              </a:blipFill>
+            </p:spPr>
+            <p:txBody>
+              <a:bodyPr/>
+              <a:lstStyle/>
+              <a:p>
+                <a:r>
+                  <a:rPr lang="en-US">
+                    <a:noFill/>
+                  </a:rPr>
+                  <a:t> </a:t>
+                </a:r>
+              </a:p>
+            </p:txBody>
+          </p:sp>
+        </mc:Fallback>
+      </mc:AlternateContent>
+      <p:cxnSp>
+        <p:nvCxnSpPr>
+          <p:cNvPr id="21" name="Straight Arrow Connector 20">
+            <a:extLst>
+              <a:ext uri="{FF2B5EF4-FFF2-40B4-BE49-F238E27FC236}">
+                <a16:creationId xmlns:a16="http://schemas.microsoft.com/office/drawing/2014/main" id="{82829ED0-2417-2C97-61EC-6A5DDF377D4B}"/>
+              </a:ext>
+            </a:extLst>
+          </p:cNvPr>
+          <p:cNvCxnSpPr>
+            <a:cxnSpLocks/>
+            <a:stCxn id="62" idx="2"/>
+          </p:cNvCxnSpPr>
+          <p:nvPr/>
+        </p:nvCxnSpPr>
+        <p:spPr>
+          <a:xfrm>
+            <a:off x="4725689" y="6357447"/>
+            <a:ext cx="0" cy="166315"/>
+          </a:xfrm>
+          <a:prstGeom prst="straightConnector1">
+            <a:avLst/>
+          </a:prstGeom>
+          <a:ln w="19050">
+            <a:solidFill>
+              <a:schemeClr val="tx1"/>
+            </a:solidFill>
+            <a:tailEnd type="triangle"/>
+          </a:ln>
+        </p:spPr>
+        <p:style>
+          <a:lnRef idx="1">
+            <a:schemeClr val="accent1"/>
+          </a:lnRef>
+          <a:fillRef idx="0">
+            <a:schemeClr val="accent1"/>
+          </a:fillRef>
+          <a:effectRef idx="0">
+            <a:schemeClr val="accent1"/>
+          </a:effectRef>
+          <a:fontRef idx="minor">
+            <a:schemeClr val="tx1"/>
+          </a:fontRef>
+        </p:style>
+      </p:cxnSp>
+      <p:sp>
+        <p:nvSpPr>
+          <p:cNvPr id="9" name="Rounded Rectangle 8">
+            <a:extLst>
+              <a:ext uri="{FF2B5EF4-FFF2-40B4-BE49-F238E27FC236}">
+                <a16:creationId xmlns:a16="http://schemas.microsoft.com/office/drawing/2014/main" id="{3478E4F8-5F88-3E92-7FAF-257415442A30}"/>
+              </a:ext>
+            </a:extLst>
+          </p:cNvPr>
+          <p:cNvSpPr/>
+          <p:nvPr/>
+        </p:nvSpPr>
+        <p:spPr>
+          <a:xfrm>
+            <a:off x="4099472" y="6523762"/>
+            <a:ext cx="1252433" cy="410291"/>
+          </a:xfrm>
+          <a:prstGeom prst="roundRect">
+            <a:avLst/>
+          </a:prstGeom>
+          <a:solidFill>
+            <a:schemeClr val="bg2">
+              <a:lumMod val="90000"/>
+            </a:schemeClr>
+          </a:solidFill>
+        </p:spPr>
+        <p:style>
+          <a:lnRef idx="2">
+            <a:schemeClr val="dk1"/>
+          </a:lnRef>
+          <a:fillRef idx="1">
+            <a:schemeClr val="lt1"/>
+          </a:fillRef>
+          <a:effectRef idx="0">
+            <a:schemeClr val="dk1"/>
+          </a:effectRef>
+          <a:fontRef idx="minor">
+            <a:schemeClr val="dk1"/>
+          </a:fontRef>
+        </p:style>
+        <p:txBody>
+          <a:bodyPr rtlCol="0" anchor="ctr"/>
+          <a:lstStyle/>
+          <a:p>
+            <a:pPr algn="ctr"/>
+            <a:r>
+              <a:rPr lang="en-US" sz="1900" dirty="0"/>
+              <a:t>Linear</a:t>
+            </a:r>
+            <a:r>
+              <a:rPr lang="en-US" sz="1100" dirty="0"/>
+              <a:t> </a:t>
+            </a:r>
+            <a:r>
+              <a:rPr lang="en-US" sz="1900" dirty="0"/>
+              <a:t>(3)</a:t>
+            </a:r>
+          </a:p>
+        </p:txBody>
+      </p:sp>
+      <p:sp>
+        <p:nvSpPr>
+          <p:cNvPr id="13" name="Rounded Rectangle 12">
+            <a:extLst>
+              <a:ext uri="{FF2B5EF4-FFF2-40B4-BE49-F238E27FC236}">
+                <a16:creationId xmlns:a16="http://schemas.microsoft.com/office/drawing/2014/main" id="{7544F584-AE92-51E7-9D8D-A7F8A311E9ED}"/>
+              </a:ext>
+            </a:extLst>
+          </p:cNvPr>
+          <p:cNvSpPr/>
+          <p:nvPr/>
+        </p:nvSpPr>
+        <p:spPr>
+          <a:xfrm>
+            <a:off x="4241537" y="2664010"/>
+            <a:ext cx="1217684" cy="635885"/>
+          </a:xfrm>
+          <a:prstGeom prst="roundRect">
+            <a:avLst/>
+          </a:prstGeom>
+          <a:solidFill>
+            <a:schemeClr val="accent6">
+              <a:lumMod val="40000"/>
+              <a:lumOff val="60000"/>
+            </a:schemeClr>
+          </a:solidFill>
+        </p:spPr>
+        <p:style>
+          <a:lnRef idx="2">
+            <a:schemeClr val="dk1"/>
+          </a:lnRef>
+          <a:fillRef idx="1">
+            <a:schemeClr val="lt1"/>
+          </a:fillRef>
+          <a:effectRef idx="0">
+            <a:schemeClr val="dk1"/>
+          </a:effectRef>
+          <a:fontRef idx="minor">
+            <a:schemeClr val="dk1"/>
+          </a:fontRef>
+        </p:style>
+        <p:txBody>
+          <a:bodyPr rtlCol="0" anchor="ctr"/>
+          <a:lstStyle/>
+          <a:p>
+            <a:pPr algn="ctr"/>
+            <a:r>
+              <a:rPr lang="en-US" sz="1900" dirty="0"/>
+              <a:t>Host Redshift</a:t>
+            </a:r>
+          </a:p>
+        </p:txBody>
+      </p:sp>
+      <p:cxnSp>
+        <p:nvCxnSpPr>
+          <p:cNvPr id="20" name="Straight Arrow Connector 37">
+            <a:extLst>
+              <a:ext uri="{FF2B5EF4-FFF2-40B4-BE49-F238E27FC236}">
+                <a16:creationId xmlns:a16="http://schemas.microsoft.com/office/drawing/2014/main" id="{E1813108-5CF3-DFB3-1725-8A969A5FEC0C}"/>
+              </a:ext>
+            </a:extLst>
+          </p:cNvPr>
+          <p:cNvCxnSpPr>
+            <a:cxnSpLocks/>
+            <a:stCxn id="13" idx="2"/>
+            <a:endCxn id="57" idx="0"/>
+          </p:cNvCxnSpPr>
+          <p:nvPr/>
+        </p:nvCxnSpPr>
+        <p:spPr>
+          <a:xfrm rot="5400000">
+            <a:off x="4617616" y="3407968"/>
+            <a:ext cx="340837" cy="124690"/>
+          </a:xfrm>
+          <a:prstGeom prst="curvedConnector3">
+            <a:avLst>
+              <a:gd name="adj1" fmla="val 50000"/>
+            </a:avLst>
+          </a:prstGeom>
+          <a:ln w="28575">
+            <a:solidFill>
+              <a:schemeClr val="tx1"/>
+            </a:solidFill>
+            <a:tailEnd type="triangle"/>
+          </a:ln>
+        </p:spPr>
+        <p:style>
+          <a:lnRef idx="1">
+            <a:schemeClr val="accent1"/>
+          </a:lnRef>
+          <a:fillRef idx="0">
+            <a:schemeClr val="accent1"/>
+          </a:fillRef>
+          <a:effectRef idx="0">
+            <a:schemeClr val="accent1"/>
+          </a:effectRef>
+          <a:fontRef idx="minor">
+            <a:schemeClr val="tx1"/>
+          </a:fontRef>
+        </p:style>
+      </p:cxnSp>
+    </p:spTree>
+    <p:extLst>
+      <p:ext uri="{BB962C8B-B14F-4D97-AF65-F5344CB8AC3E}">
+        <p14:creationId xmlns:p14="http://schemas.microsoft.com/office/powerpoint/2010/main" val="2201867076"/>
+      </p:ext>
+    </p:extLst>
+  </p:cSld>
+  <p:clrMapOvr>
+    <a:masterClrMapping/>
+  </p:clrMapOvr>
+</p:sld>
+</file>
+
+<file path=ppt/slides/slide5.xml><?xml version="1.0" encoding="utf-8"?>
+<p:sld xmlns:a="http://schemas.openxmlformats.org/drawingml/2006/main" xmlns:r="http://schemas.openxmlformats.org/officeDocument/2006/relationships" xmlns:p="http://schemas.openxmlformats.org/presentationml/2006/main">
+  <p:cSld>
+    <p:spTree>
+      <p:nvGrpSpPr>
+        <p:cNvPr id="1" name="">
+          <a:extLst>
+            <a:ext uri="{FF2B5EF4-FFF2-40B4-BE49-F238E27FC236}">
+              <a16:creationId xmlns:a16="http://schemas.microsoft.com/office/drawing/2014/main" id="{18C5DAE5-CA61-3B2B-DC7F-D60D478AB58B}"/>
+            </a:ext>
+          </a:extLst>
+        </p:cNvPr>
+        <p:cNvGrpSpPr/>
+        <p:nvPr/>
+      </p:nvGrpSpPr>
+      <p:grpSpPr>
+        <a:xfrm>
+          <a:off x="0" y="0"/>
+          <a:ext cx="0" cy="0"/>
+          <a:chOff x="0" y="0"/>
+          <a:chExt cx="0" cy="0"/>
+        </a:xfrm>
+      </p:grpSpPr>
+      <p:grpSp>
+        <p:nvGrpSpPr>
+          <p:cNvPr id="34" name="Group 33">
+            <a:extLst>
+              <a:ext uri="{FF2B5EF4-FFF2-40B4-BE49-F238E27FC236}">
+                <a16:creationId xmlns:a16="http://schemas.microsoft.com/office/drawing/2014/main" id="{1F61299E-A1A8-2CEF-8CBC-6DA50AD79096}"/>
+              </a:ext>
+            </a:extLst>
+          </p:cNvPr>
+          <p:cNvGrpSpPr/>
+          <p:nvPr/>
+        </p:nvGrpSpPr>
+        <p:grpSpPr>
+          <a:xfrm>
+            <a:off x="1193741" y="3191663"/>
+            <a:ext cx="1823761" cy="2760673"/>
+            <a:chOff x="1705253" y="3481787"/>
+            <a:chExt cx="1823761" cy="2760673"/>
+          </a:xfrm>
+        </p:grpSpPr>
+        <p:sp>
+          <p:nvSpPr>
+            <p:cNvPr id="19" name="Rounded Rectangle 18">
+              <a:extLst>
+                <a:ext uri="{FF2B5EF4-FFF2-40B4-BE49-F238E27FC236}">
+                  <a16:creationId xmlns:a16="http://schemas.microsoft.com/office/drawing/2014/main" id="{A9C50121-C8B6-9DC4-DC5E-3F07853F876F}"/>
+                </a:ext>
+              </a:extLst>
+            </p:cNvPr>
+            <p:cNvSpPr/>
+            <p:nvPr/>
+          </p:nvSpPr>
+          <p:spPr>
+            <a:xfrm>
+              <a:off x="1705253" y="3481787"/>
+              <a:ext cx="1823761" cy="2760673"/>
+            </a:xfrm>
+            <a:prstGeom prst="roundRect">
+              <a:avLst/>
+            </a:prstGeom>
+            <a:solidFill>
+              <a:schemeClr val="bg1">
+                <a:lumMod val="95000"/>
+              </a:schemeClr>
+            </a:solidFill>
+            <a:ln w="25400"/>
+          </p:spPr>
+          <p:style>
+            <a:lnRef idx="2">
+              <a:schemeClr val="accent1">
+                <a:shade val="15000"/>
+              </a:schemeClr>
+            </a:lnRef>
+            <a:fillRef idx="1">
+              <a:schemeClr val="accent1"/>
+            </a:fillRef>
+            <a:effectRef idx="0">
+              <a:schemeClr val="accent1"/>
+            </a:effectRef>
+            <a:fontRef idx="minor">
+              <a:schemeClr val="lt1"/>
+            </a:fontRef>
+          </p:style>
+          <p:txBody>
+            <a:bodyPr rtlCol="0" anchor="t" anchorCtr="0"/>
+            <a:lstStyle/>
+            <a:p>
+              <a:pPr algn="ctr"/>
+              <a:r>
+                <a:rPr lang="en-US" sz="3000" b="1" dirty="0">
+                  <a:solidFill>
+                    <a:schemeClr val="tx1"/>
+                  </a:solidFill>
+                </a:rPr>
+                <a:t>Legend</a:t>
+              </a:r>
+            </a:p>
+          </p:txBody>
+        </p:sp>
+        <p:sp>
+          <p:nvSpPr>
+            <p:cNvPr id="17" name="Rounded Rectangle 16">
+              <a:extLst>
+                <a:ext uri="{FF2B5EF4-FFF2-40B4-BE49-F238E27FC236}">
+                  <a16:creationId xmlns:a16="http://schemas.microsoft.com/office/drawing/2014/main" id="{EAED3486-D361-6220-8F0C-7B7A9D26BD82}"/>
+                </a:ext>
+              </a:extLst>
+            </p:cNvPr>
+            <p:cNvSpPr/>
+            <p:nvPr/>
+          </p:nvSpPr>
+          <p:spPr>
+            <a:xfrm>
+              <a:off x="1841217" y="5366305"/>
+              <a:ext cx="1570123" cy="692425"/>
+            </a:xfrm>
+            <a:prstGeom prst="roundRect">
+              <a:avLst/>
+            </a:prstGeom>
+            <a:solidFill>
+              <a:schemeClr val="bg2">
+                <a:lumMod val="90000"/>
+              </a:schemeClr>
+            </a:solidFill>
+            <a:ln w="25400"/>
+          </p:spPr>
+          <p:style>
+            <a:lnRef idx="2">
+              <a:schemeClr val="dk1"/>
+            </a:lnRef>
+            <a:fillRef idx="1">
+              <a:schemeClr val="lt1"/>
+            </a:fillRef>
+            <a:effectRef idx="0">
+              <a:schemeClr val="dk1"/>
+            </a:effectRef>
+            <a:fontRef idx="minor">
+              <a:schemeClr val="dk1"/>
+            </a:fontRef>
+          </p:style>
+          <p:txBody>
+            <a:bodyPr rtlCol="0" anchor="ctr"/>
+            <a:lstStyle/>
+            <a:p>
+              <a:pPr algn="ctr"/>
+              <a:r>
+                <a:rPr lang="en-US" sz="1900" dirty="0"/>
+                <a:t>Input/Output Layer</a:t>
+              </a:r>
+            </a:p>
+          </p:txBody>
+        </p:sp>
+        <p:sp>
+          <p:nvSpPr>
+            <p:cNvPr id="18" name="Rounded Rectangle 17">
+              <a:extLst>
+                <a:ext uri="{FF2B5EF4-FFF2-40B4-BE49-F238E27FC236}">
+                  <a16:creationId xmlns:a16="http://schemas.microsoft.com/office/drawing/2014/main" id="{A83BCBA4-32A2-4DCA-211F-33A6EEECB170}"/>
+                </a:ext>
+              </a:extLst>
+            </p:cNvPr>
+            <p:cNvSpPr/>
+            <p:nvPr/>
+          </p:nvSpPr>
+          <p:spPr>
+            <a:xfrm>
+              <a:off x="1821091" y="4795133"/>
+              <a:ext cx="1570123" cy="432081"/>
+            </a:xfrm>
+            <a:prstGeom prst="roundRect">
+              <a:avLst/>
+            </a:prstGeom>
+            <a:solidFill>
+              <a:schemeClr val="accent1">
+                <a:lumMod val="60000"/>
+                <a:lumOff val="40000"/>
+              </a:schemeClr>
+            </a:solidFill>
+            <a:ln w="25400"/>
+          </p:spPr>
+          <p:style>
+            <a:lnRef idx="2">
+              <a:schemeClr val="dk1"/>
+            </a:lnRef>
+            <a:fillRef idx="1">
+              <a:schemeClr val="lt1"/>
+            </a:fillRef>
+            <a:effectRef idx="0">
+              <a:schemeClr val="dk1"/>
+            </a:effectRef>
+            <a:fontRef idx="minor">
+              <a:schemeClr val="dk1"/>
+            </a:fontRef>
+          </p:style>
+          <p:txBody>
+            <a:bodyPr rtlCol="0" anchor="ctr"/>
+            <a:lstStyle/>
+            <a:p>
+              <a:pPr algn="ctr"/>
+              <a:r>
+                <a:rPr lang="en-US" sz="1900" dirty="0"/>
+                <a:t>Hidden Layer</a:t>
+              </a:r>
+            </a:p>
+          </p:txBody>
+        </p:sp>
+        <p:sp>
+          <p:nvSpPr>
+            <p:cNvPr id="58" name="Rounded Rectangle 57">
+              <a:extLst>
+                <a:ext uri="{FF2B5EF4-FFF2-40B4-BE49-F238E27FC236}">
+                  <a16:creationId xmlns:a16="http://schemas.microsoft.com/office/drawing/2014/main" id="{66D2183D-EC99-9C24-D980-841C5D726243}"/>
+                </a:ext>
+              </a:extLst>
+            </p:cNvPr>
+            <p:cNvSpPr/>
+            <p:nvPr/>
+          </p:nvSpPr>
+          <p:spPr>
+            <a:xfrm>
+              <a:off x="1791129" y="4219797"/>
+              <a:ext cx="1656517" cy="432081"/>
+            </a:xfrm>
+            <a:prstGeom prst="roundRect">
+              <a:avLst/>
+            </a:prstGeom>
+            <a:solidFill>
+              <a:schemeClr val="accent6">
+                <a:lumMod val="40000"/>
+                <a:lumOff val="60000"/>
+              </a:schemeClr>
+            </a:solidFill>
+            <a:ln w="25400"/>
+          </p:spPr>
+          <p:style>
+            <a:lnRef idx="2">
+              <a:schemeClr val="dk1"/>
+            </a:lnRef>
+            <a:fillRef idx="1">
+              <a:schemeClr val="lt1"/>
+            </a:fillRef>
+            <a:effectRef idx="0">
+              <a:schemeClr val="dk1"/>
+            </a:effectRef>
+            <a:fontRef idx="minor">
+              <a:schemeClr val="dk1"/>
+            </a:fontRef>
+          </p:style>
+          <p:txBody>
+            <a:bodyPr rtlCol="0" anchor="ctr"/>
+            <a:lstStyle/>
+            <a:p>
+              <a:pPr algn="ctr"/>
+              <a:r>
+                <a:rPr lang="en-US" sz="1900" dirty="0"/>
+                <a:t>Physical Value</a:t>
+              </a:r>
+            </a:p>
+          </p:txBody>
+        </p:sp>
+      </p:grpSp>
+      <p:sp>
+        <p:nvSpPr>
+          <p:cNvPr id="57" name="Rounded Rectangle 56">
+            <a:extLst>
+              <a:ext uri="{FF2B5EF4-FFF2-40B4-BE49-F238E27FC236}">
+                <a16:creationId xmlns:a16="http://schemas.microsoft.com/office/drawing/2014/main" id="{87F768FE-2F62-1EB5-8A6D-7E846A3038E5}"/>
+              </a:ext>
+            </a:extLst>
+          </p:cNvPr>
+          <p:cNvSpPr/>
+          <p:nvPr/>
+        </p:nvSpPr>
+        <p:spPr>
+          <a:xfrm>
+            <a:off x="4099472" y="3640732"/>
+            <a:ext cx="1252433" cy="410291"/>
+          </a:xfrm>
+          <a:prstGeom prst="roundRect">
+            <a:avLst/>
+          </a:prstGeom>
+          <a:solidFill>
+            <a:schemeClr val="bg2">
+              <a:lumMod val="90000"/>
+            </a:schemeClr>
+          </a:solidFill>
+        </p:spPr>
+        <p:style>
+          <a:lnRef idx="2">
+            <a:schemeClr val="dk1"/>
+          </a:lnRef>
+          <a:fillRef idx="1">
+            <a:schemeClr val="lt1"/>
+          </a:fillRef>
+          <a:effectRef idx="0">
+            <a:schemeClr val="dk1"/>
+          </a:effectRef>
+          <a:fontRef idx="minor">
+            <a:schemeClr val="dk1"/>
+          </a:fontRef>
+        </p:style>
+        <p:txBody>
+          <a:bodyPr rtlCol="0" anchor="ctr"/>
+          <a:lstStyle/>
+          <a:p>
+            <a:pPr algn="ctr"/>
+            <a:r>
+              <a:rPr lang="en-US" sz="1900" dirty="0"/>
+              <a:t>Input (6)</a:t>
+            </a:r>
+          </a:p>
+        </p:txBody>
+      </p:sp>
+      <p:sp>
+        <p:nvSpPr>
+          <p:cNvPr id="59" name="Rounded Rectangle 58">
+            <a:extLst>
+              <a:ext uri="{FF2B5EF4-FFF2-40B4-BE49-F238E27FC236}">
+                <a16:creationId xmlns:a16="http://schemas.microsoft.com/office/drawing/2014/main" id="{534E44DB-0185-B2C4-1764-7633255A2FE6}"/>
+              </a:ext>
+            </a:extLst>
+          </p:cNvPr>
+          <p:cNvSpPr/>
+          <p:nvPr/>
+        </p:nvSpPr>
+        <p:spPr>
+          <a:xfrm>
+            <a:off x="4099472" y="4217338"/>
+            <a:ext cx="1252433" cy="410291"/>
+          </a:xfrm>
+          <a:prstGeom prst="roundRect">
+            <a:avLst/>
+          </a:prstGeom>
+          <a:solidFill>
+            <a:schemeClr val="accent1">
+              <a:lumMod val="60000"/>
+              <a:lumOff val="40000"/>
+            </a:schemeClr>
+          </a:solidFill>
+        </p:spPr>
+        <p:style>
+          <a:lnRef idx="2">
+            <a:schemeClr val="dk1"/>
+          </a:lnRef>
+          <a:fillRef idx="1">
+            <a:schemeClr val="lt1"/>
+          </a:fillRef>
+          <a:effectRef idx="0">
+            <a:schemeClr val="dk1"/>
+          </a:effectRef>
+          <a:fontRef idx="minor">
+            <a:schemeClr val="dk1"/>
+          </a:fontRef>
+        </p:style>
+        <p:txBody>
+          <a:bodyPr rtlCol="0" anchor="ctr"/>
+          <a:lstStyle/>
+          <a:p>
+            <a:pPr algn="ctr"/>
+            <a:r>
+              <a:rPr lang="en-US" sz="1900" dirty="0" err="1"/>
+              <a:t>ReLU</a:t>
+            </a:r>
+            <a:r>
+              <a:rPr lang="en-US" sz="1900" dirty="0"/>
+              <a:t> (6)</a:t>
+            </a:r>
+          </a:p>
+        </p:txBody>
+      </p:sp>
+      <p:sp>
+        <p:nvSpPr>
+          <p:cNvPr id="60" name="Rounded Rectangle 59">
+            <a:extLst>
+              <a:ext uri="{FF2B5EF4-FFF2-40B4-BE49-F238E27FC236}">
+                <a16:creationId xmlns:a16="http://schemas.microsoft.com/office/drawing/2014/main" id="{EED65D21-D336-05A0-023F-09DF5DF1F930}"/>
+              </a:ext>
+            </a:extLst>
+          </p:cNvPr>
+          <p:cNvSpPr/>
+          <p:nvPr/>
+        </p:nvSpPr>
+        <p:spPr>
+          <a:xfrm>
+            <a:off x="4099472" y="4793944"/>
+            <a:ext cx="1252433" cy="410291"/>
+          </a:xfrm>
+          <a:prstGeom prst="roundRect">
+            <a:avLst/>
+          </a:prstGeom>
+          <a:solidFill>
+            <a:schemeClr val="accent1">
+              <a:lumMod val="60000"/>
+              <a:lumOff val="40000"/>
+            </a:schemeClr>
+          </a:solidFill>
+        </p:spPr>
+        <p:style>
+          <a:lnRef idx="2">
+            <a:schemeClr val="dk1"/>
+          </a:lnRef>
+          <a:fillRef idx="1">
+            <a:schemeClr val="lt1"/>
+          </a:fillRef>
+          <a:effectRef idx="0">
+            <a:schemeClr val="dk1"/>
+          </a:effectRef>
+          <a:fontRef idx="minor">
+            <a:schemeClr val="dk1"/>
+          </a:fontRef>
+        </p:style>
+        <p:txBody>
+          <a:bodyPr rtlCol="0" anchor="ctr"/>
+          <a:lstStyle/>
+          <a:p>
+            <a:pPr algn="ctr"/>
+            <a:r>
+              <a:rPr lang="en-US" sz="1900" dirty="0" err="1"/>
+              <a:t>ReLU</a:t>
+            </a:r>
+            <a:r>
+              <a:rPr lang="en-US" sz="1900" dirty="0"/>
+              <a:t> (5)</a:t>
+            </a:r>
+          </a:p>
+        </p:txBody>
+      </p:sp>
+      <p:sp>
+        <p:nvSpPr>
+          <p:cNvPr id="61" name="Rounded Rectangle 60">
+            <a:extLst>
+              <a:ext uri="{FF2B5EF4-FFF2-40B4-BE49-F238E27FC236}">
+                <a16:creationId xmlns:a16="http://schemas.microsoft.com/office/drawing/2014/main" id="{30D801E6-C731-A605-EBB8-253623BCB07C}"/>
+              </a:ext>
+            </a:extLst>
+          </p:cNvPr>
+          <p:cNvSpPr/>
+          <p:nvPr/>
+        </p:nvSpPr>
+        <p:spPr>
+          <a:xfrm>
+            <a:off x="4099472" y="5370550"/>
+            <a:ext cx="1252433" cy="410291"/>
+          </a:xfrm>
+          <a:prstGeom prst="roundRect">
+            <a:avLst/>
+          </a:prstGeom>
+          <a:solidFill>
+            <a:schemeClr val="accent1">
+              <a:lumMod val="60000"/>
+              <a:lumOff val="40000"/>
+            </a:schemeClr>
+          </a:solidFill>
+        </p:spPr>
+        <p:style>
+          <a:lnRef idx="2">
+            <a:schemeClr val="dk1"/>
+          </a:lnRef>
+          <a:fillRef idx="1">
+            <a:schemeClr val="lt1"/>
+          </a:fillRef>
+          <a:effectRef idx="0">
+            <a:schemeClr val="dk1"/>
+          </a:effectRef>
+          <a:fontRef idx="minor">
+            <a:schemeClr val="dk1"/>
+          </a:fontRef>
+        </p:style>
+        <p:txBody>
+          <a:bodyPr rtlCol="0" anchor="ctr"/>
+          <a:lstStyle/>
+          <a:p>
+            <a:pPr algn="ctr"/>
+            <a:r>
+              <a:rPr lang="en-US" sz="1900" dirty="0" err="1"/>
+              <a:t>ReLU</a:t>
+            </a:r>
+            <a:r>
+              <a:rPr lang="en-US" sz="1900" dirty="0"/>
+              <a:t> (4)</a:t>
+            </a:r>
+          </a:p>
+        </p:txBody>
+      </p:sp>
+      <p:sp>
+        <p:nvSpPr>
+          <p:cNvPr id="62" name="Rounded Rectangle 61">
+            <a:extLst>
+              <a:ext uri="{FF2B5EF4-FFF2-40B4-BE49-F238E27FC236}">
+                <a16:creationId xmlns:a16="http://schemas.microsoft.com/office/drawing/2014/main" id="{212F0235-4189-7404-8493-CD213947FEFD}"/>
+              </a:ext>
+            </a:extLst>
+          </p:cNvPr>
+          <p:cNvSpPr/>
+          <p:nvPr/>
+        </p:nvSpPr>
+        <p:spPr>
+          <a:xfrm>
+            <a:off x="4099472" y="5947156"/>
+            <a:ext cx="1252433" cy="410291"/>
+          </a:xfrm>
+          <a:prstGeom prst="roundRect">
+            <a:avLst/>
+          </a:prstGeom>
+          <a:solidFill>
+            <a:schemeClr val="accent1">
+              <a:lumMod val="60000"/>
+              <a:lumOff val="40000"/>
+            </a:schemeClr>
+          </a:solidFill>
+        </p:spPr>
+        <p:style>
+          <a:lnRef idx="2">
+            <a:schemeClr val="dk1"/>
+          </a:lnRef>
+          <a:fillRef idx="1">
+            <a:schemeClr val="lt1"/>
+          </a:fillRef>
+          <a:effectRef idx="0">
+            <a:schemeClr val="dk1"/>
+          </a:effectRef>
+          <a:fontRef idx="minor">
+            <a:schemeClr val="dk1"/>
+          </a:fontRef>
+        </p:style>
+        <p:txBody>
+          <a:bodyPr rtlCol="0" anchor="ctr"/>
+          <a:lstStyle/>
+          <a:p>
+            <a:pPr algn="ctr"/>
+            <a:r>
+              <a:rPr lang="en-US" sz="1900" dirty="0" err="1"/>
+              <a:t>ReLU</a:t>
+            </a:r>
+            <a:r>
+              <a:rPr lang="en-US" sz="1900" dirty="0"/>
+              <a:t> (3)</a:t>
+            </a:r>
+          </a:p>
+        </p:txBody>
+      </p:sp>
+      <p:cxnSp>
+        <p:nvCxnSpPr>
+          <p:cNvPr id="455" name="Straight Arrow Connector 454">
+            <a:extLst>
+              <a:ext uri="{FF2B5EF4-FFF2-40B4-BE49-F238E27FC236}">
+                <a16:creationId xmlns:a16="http://schemas.microsoft.com/office/drawing/2014/main" id="{ED73C4C6-99A4-07AD-F1E0-969A2AE42D80}"/>
+              </a:ext>
+            </a:extLst>
+          </p:cNvPr>
+          <p:cNvCxnSpPr>
+            <a:cxnSpLocks/>
+            <a:stCxn id="57" idx="2"/>
+            <a:endCxn id="59" idx="0"/>
+          </p:cNvCxnSpPr>
+          <p:nvPr/>
+        </p:nvCxnSpPr>
+        <p:spPr>
+          <a:xfrm>
+            <a:off x="4725689" y="4051023"/>
+            <a:ext cx="0" cy="166315"/>
+          </a:xfrm>
+          <a:prstGeom prst="straightConnector1">
+            <a:avLst/>
+          </a:prstGeom>
+          <a:ln w="19050">
+            <a:solidFill>
+              <a:schemeClr val="tx1"/>
+            </a:solidFill>
+            <a:tailEnd type="triangle"/>
+          </a:ln>
+        </p:spPr>
+        <p:style>
+          <a:lnRef idx="1">
+            <a:schemeClr val="accent1"/>
+          </a:lnRef>
+          <a:fillRef idx="0">
+            <a:schemeClr val="accent1"/>
+          </a:fillRef>
+          <a:effectRef idx="0">
+            <a:schemeClr val="accent1"/>
+          </a:effectRef>
+          <a:fontRef idx="minor">
+            <a:schemeClr val="tx1"/>
+          </a:fontRef>
+        </p:style>
+      </p:cxnSp>
+      <p:cxnSp>
+        <p:nvCxnSpPr>
+          <p:cNvPr id="456" name="Straight Arrow Connector 455">
+            <a:extLst>
+              <a:ext uri="{FF2B5EF4-FFF2-40B4-BE49-F238E27FC236}">
+                <a16:creationId xmlns:a16="http://schemas.microsoft.com/office/drawing/2014/main" id="{D4267035-3E0B-1A01-2AB4-7F9874396082}"/>
+              </a:ext>
+            </a:extLst>
+          </p:cNvPr>
+          <p:cNvCxnSpPr>
+            <a:cxnSpLocks/>
+            <a:stCxn id="59" idx="2"/>
+            <a:endCxn id="60" idx="0"/>
+          </p:cNvCxnSpPr>
+          <p:nvPr/>
+        </p:nvCxnSpPr>
+        <p:spPr>
+          <a:xfrm>
+            <a:off x="4725689" y="4627629"/>
+            <a:ext cx="0" cy="166315"/>
+          </a:xfrm>
+          <a:prstGeom prst="straightConnector1">
+            <a:avLst/>
+          </a:prstGeom>
+          <a:ln w="19050">
+            <a:solidFill>
+              <a:schemeClr val="tx1"/>
+            </a:solidFill>
+            <a:tailEnd type="triangle"/>
+          </a:ln>
+        </p:spPr>
+        <p:style>
+          <a:lnRef idx="1">
+            <a:schemeClr val="accent1"/>
+          </a:lnRef>
+          <a:fillRef idx="0">
+            <a:schemeClr val="accent1"/>
+          </a:fillRef>
+          <a:effectRef idx="0">
+            <a:schemeClr val="accent1"/>
+          </a:effectRef>
+          <a:fontRef idx="minor">
+            <a:schemeClr val="tx1"/>
+          </a:fontRef>
+        </p:style>
+      </p:cxnSp>
+      <p:cxnSp>
+        <p:nvCxnSpPr>
+          <p:cNvPr id="457" name="Straight Arrow Connector 456">
+            <a:extLst>
+              <a:ext uri="{FF2B5EF4-FFF2-40B4-BE49-F238E27FC236}">
+                <a16:creationId xmlns:a16="http://schemas.microsoft.com/office/drawing/2014/main" id="{B00EB369-1904-9EA7-F9CE-DFE603884B63}"/>
+              </a:ext>
+            </a:extLst>
+          </p:cNvPr>
+          <p:cNvCxnSpPr>
+            <a:cxnSpLocks/>
+            <a:stCxn id="60" idx="2"/>
+            <a:endCxn id="61" idx="0"/>
+          </p:cNvCxnSpPr>
+          <p:nvPr/>
+        </p:nvCxnSpPr>
+        <p:spPr>
+          <a:xfrm>
+            <a:off x="4725689" y="5204235"/>
+            <a:ext cx="0" cy="166315"/>
+          </a:xfrm>
+          <a:prstGeom prst="straightConnector1">
+            <a:avLst/>
+          </a:prstGeom>
+          <a:ln w="19050">
+            <a:solidFill>
+              <a:schemeClr val="tx1"/>
+            </a:solidFill>
+            <a:tailEnd type="triangle"/>
+          </a:ln>
+        </p:spPr>
+        <p:style>
+          <a:lnRef idx="1">
+            <a:schemeClr val="accent1"/>
+          </a:lnRef>
+          <a:fillRef idx="0">
+            <a:schemeClr val="accent1"/>
+          </a:fillRef>
+          <a:effectRef idx="0">
+            <a:schemeClr val="accent1"/>
+          </a:effectRef>
+          <a:fontRef idx="minor">
+            <a:schemeClr val="tx1"/>
+          </a:fontRef>
+        </p:style>
+      </p:cxnSp>
+      <p:cxnSp>
+        <p:nvCxnSpPr>
+          <p:cNvPr id="458" name="Straight Arrow Connector 457">
+            <a:extLst>
+              <a:ext uri="{FF2B5EF4-FFF2-40B4-BE49-F238E27FC236}">
+                <a16:creationId xmlns:a16="http://schemas.microsoft.com/office/drawing/2014/main" id="{A071FF33-09CD-CF29-BBEF-34120CC17FF1}"/>
+              </a:ext>
+            </a:extLst>
+          </p:cNvPr>
+          <p:cNvCxnSpPr>
+            <a:cxnSpLocks/>
+            <a:stCxn id="61" idx="2"/>
+            <a:endCxn id="62" idx="0"/>
+          </p:cNvCxnSpPr>
+          <p:nvPr/>
+        </p:nvCxnSpPr>
+        <p:spPr>
+          <a:xfrm>
+            <a:off x="4725689" y="5780841"/>
+            <a:ext cx="0" cy="166315"/>
+          </a:xfrm>
+          <a:prstGeom prst="straightConnector1">
+            <a:avLst/>
+          </a:prstGeom>
+          <a:ln w="19050">
+            <a:solidFill>
+              <a:schemeClr val="tx1"/>
+            </a:solidFill>
+            <a:tailEnd type="triangle"/>
+          </a:ln>
+        </p:spPr>
+        <p:style>
+          <a:lnRef idx="1">
+            <a:schemeClr val="accent1"/>
+          </a:lnRef>
+          <a:fillRef idx="0">
+            <a:schemeClr val="accent1"/>
+          </a:fillRef>
+          <a:effectRef idx="0">
+            <a:schemeClr val="accent1"/>
+          </a:effectRef>
+          <a:fontRef idx="minor">
+            <a:schemeClr val="tx1"/>
+          </a:fontRef>
+        </p:style>
+      </p:cxnSp>
+      <p:cxnSp>
+        <p:nvCxnSpPr>
+          <p:cNvPr id="464" name="Straight Arrow Connector 37">
+            <a:extLst>
+              <a:ext uri="{FF2B5EF4-FFF2-40B4-BE49-F238E27FC236}">
+                <a16:creationId xmlns:a16="http://schemas.microsoft.com/office/drawing/2014/main" id="{4D027990-5FA3-F5A7-2E0F-674A9D851075}"/>
+              </a:ext>
+            </a:extLst>
+          </p:cNvPr>
+          <p:cNvCxnSpPr>
+            <a:cxnSpLocks/>
+            <a:stCxn id="467" idx="2"/>
+            <a:endCxn id="57" idx="0"/>
+          </p:cNvCxnSpPr>
+          <p:nvPr/>
+        </p:nvCxnSpPr>
+        <p:spPr>
+          <a:xfrm rot="16200000" flipH="1">
+            <a:off x="4136310" y="3051353"/>
+            <a:ext cx="330198" cy="848560"/>
+          </a:xfrm>
+          <a:prstGeom prst="curvedConnector3">
+            <a:avLst>
+              <a:gd name="adj1" fmla="val 50000"/>
+            </a:avLst>
+          </a:prstGeom>
+          <a:ln w="28575">
+            <a:solidFill>
+              <a:schemeClr val="tx1"/>
+            </a:solidFill>
+            <a:tailEnd type="triangle"/>
+          </a:ln>
+        </p:spPr>
+        <p:style>
+          <a:lnRef idx="1">
+            <a:schemeClr val="accent1"/>
+          </a:lnRef>
+          <a:fillRef idx="0">
+            <a:schemeClr val="accent1"/>
+          </a:fillRef>
+          <a:effectRef idx="0">
+            <a:schemeClr val="accent1"/>
+          </a:effectRef>
+          <a:fontRef idx="minor">
+            <a:schemeClr val="tx1"/>
+          </a:fontRef>
+        </p:style>
+      </p:cxnSp>
+      <p:sp>
+        <p:nvSpPr>
+          <p:cNvPr id="467" name="Rounded Rectangle 466">
+            <a:extLst>
+              <a:ext uri="{FF2B5EF4-FFF2-40B4-BE49-F238E27FC236}">
+                <a16:creationId xmlns:a16="http://schemas.microsoft.com/office/drawing/2014/main" id="{F9477D84-6E87-547D-A74C-646B1DB54330}"/>
+              </a:ext>
+            </a:extLst>
+          </p:cNvPr>
+          <p:cNvSpPr/>
+          <p:nvPr/>
+        </p:nvSpPr>
+        <p:spPr>
+          <a:xfrm>
+            <a:off x="3268287" y="2900242"/>
+            <a:ext cx="1217684" cy="410292"/>
+          </a:xfrm>
+          <a:prstGeom prst="roundRect">
+            <a:avLst/>
+          </a:prstGeom>
+          <a:solidFill>
+            <a:schemeClr val="accent6">
+              <a:lumMod val="40000"/>
+              <a:lumOff val="60000"/>
+            </a:schemeClr>
+          </a:solidFill>
+        </p:spPr>
+        <p:style>
+          <a:lnRef idx="2">
+            <a:schemeClr val="dk1"/>
+          </a:lnRef>
+          <a:fillRef idx="1">
+            <a:schemeClr val="lt1"/>
+          </a:fillRef>
+          <a:effectRef idx="0">
+            <a:schemeClr val="dk1"/>
+          </a:effectRef>
+          <a:fontRef idx="minor">
+            <a:schemeClr val="dk1"/>
+          </a:fontRef>
+        </p:style>
+        <p:txBody>
+          <a:bodyPr rtlCol="0" anchor="ctr"/>
+          <a:lstStyle/>
+          <a:p>
+            <a:pPr algn="ctr"/>
+            <a:r>
+              <a:rPr lang="en-US" sz="1900" dirty="0"/>
+              <a:t>Host </a:t>
+            </a:r>
+            <a:r>
+              <a:rPr lang="en-US" sz="1900" i="1" dirty="0"/>
+              <a:t>grizy</a:t>
+            </a:r>
+          </a:p>
+        </p:txBody>
+      </p:sp>
+      <p:cxnSp>
+        <p:nvCxnSpPr>
+          <p:cNvPr id="486" name="Curved Connector 485">
+            <a:extLst>
+              <a:ext uri="{FF2B5EF4-FFF2-40B4-BE49-F238E27FC236}">
+                <a16:creationId xmlns:a16="http://schemas.microsoft.com/office/drawing/2014/main" id="{AAD1A622-2BFE-11F4-282A-BDFD7B9947B5}"/>
+              </a:ext>
+            </a:extLst>
+          </p:cNvPr>
+          <p:cNvCxnSpPr>
+            <a:cxnSpLocks/>
+            <a:stCxn id="9" idx="2"/>
+            <a:endCxn id="6" idx="0"/>
+          </p:cNvCxnSpPr>
+          <p:nvPr/>
+        </p:nvCxnSpPr>
+        <p:spPr>
+          <a:xfrm rot="16200000" flipH="1">
+            <a:off x="4644815" y="7014927"/>
+            <a:ext cx="166315" cy="4566"/>
+          </a:xfrm>
+          <a:prstGeom prst="curvedConnector3">
+            <a:avLst>
+              <a:gd name="adj1" fmla="val 50000"/>
+            </a:avLst>
+          </a:prstGeom>
+          <a:ln w="28575">
+            <a:solidFill>
+              <a:schemeClr val="tx1"/>
+            </a:solidFill>
+            <a:tailEnd type="triangle"/>
+          </a:ln>
+        </p:spPr>
+        <p:style>
+          <a:lnRef idx="1">
+            <a:schemeClr val="accent1"/>
+          </a:lnRef>
+          <a:fillRef idx="0">
+            <a:schemeClr val="accent1"/>
+          </a:fillRef>
+          <a:effectRef idx="0">
+            <a:schemeClr val="accent1"/>
+          </a:effectRef>
+          <a:fontRef idx="minor">
+            <a:schemeClr val="tx1"/>
+          </a:fontRef>
+        </p:style>
+      </p:cxnSp>
+      <mc:AlternateContent xmlns:mc="http://schemas.openxmlformats.org/markup-compatibility/2006" xmlns:a14="http://schemas.microsoft.com/office/drawing/2010/main">
+        <mc:Choice Requires="a14">
+          <p:sp>
+            <p:nvSpPr>
+              <p:cNvPr id="6" name="Rounded Rectangle 5">
+                <a:extLst>
+                  <a:ext uri="{FF2B5EF4-FFF2-40B4-BE49-F238E27FC236}">
+                    <a16:creationId xmlns:a16="http://schemas.microsoft.com/office/drawing/2014/main" id="{C4155A2C-8878-6A25-D80A-A73C1C2E852A}"/>
+                  </a:ext>
+                </a:extLst>
+              </p:cNvPr>
+              <p:cNvSpPr/>
+              <p:nvPr/>
+            </p:nvSpPr>
+            <p:spPr>
+              <a:xfrm>
+                <a:off x="3683395" y="7100368"/>
+                <a:ext cx="2093719" cy="635885"/>
+              </a:xfrm>
+              <a:prstGeom prst="roundRect">
+                <a:avLst/>
+              </a:prstGeom>
+              <a:solidFill>
+                <a:schemeClr val="accent6">
+                  <a:lumMod val="40000"/>
+                  <a:lumOff val="60000"/>
+                </a:schemeClr>
+              </a:solidFill>
+            </p:spPr>
+            <p:style>
+              <a:lnRef idx="2">
+                <a:schemeClr val="dk1"/>
+              </a:lnRef>
+              <a:fillRef idx="1">
+                <a:schemeClr val="lt1"/>
+              </a:fillRef>
+              <a:effectRef idx="0">
+                <a:schemeClr val="dk1"/>
+              </a:effectRef>
+              <a:fontRef idx="minor">
+                <a:schemeClr val="dk1"/>
+              </a:fontRef>
+            </p:style>
+            <p:txBody>
+              <a:bodyPr rtlCol="0" anchor="ctr"/>
+              <a:lstStyle/>
+              <a:p>
+                <a:pPr algn="ctr"/>
+                <a:r>
+                  <a:rPr lang="en-US" sz="1900" dirty="0"/>
+                  <a:t>Host Properties</a:t>
+                </a:r>
+              </a:p>
+              <a:p>
+                <a:pPr algn="ctr"/>
+                <a:r>
+                  <a:rPr lang="en-US" sz="1900" dirty="0"/>
+                  <a:t>[</a:t>
+                </a:r>
+                <a14:m>
+                  <m:oMath xmlns:m="http://schemas.openxmlformats.org/officeDocument/2006/math">
+                    <m:func>
+                      <m:funcPr>
+                        <m:ctrlPr>
+                          <a:rPr lang="en-US" sz="1900" b="0" i="1" smtClean="0">
+                            <a:latin typeface="Cambria Math" panose="02040503050406030204" pitchFamily="18" charset="0"/>
+                          </a:rPr>
+                        </m:ctrlPr>
+                      </m:funcPr>
+                      <m:fName>
+                        <m:r>
+                          <m:rPr>
+                            <m:sty m:val="p"/>
+                          </m:rPr>
+                          <a:rPr lang="en-US" sz="1900" b="0" i="0" smtClean="0">
+                            <a:latin typeface="Cambria Math" panose="02040503050406030204" pitchFamily="18" charset="0"/>
+                          </a:rPr>
+                          <m:t>log</m:t>
+                        </m:r>
+                      </m:fName>
+                      <m:e>
+                        <m:sSub>
+                          <m:sSubPr>
+                            <m:ctrlPr>
+                              <a:rPr lang="en-US" sz="1900" b="0" i="1" smtClean="0">
+                                <a:latin typeface="Cambria Math" panose="02040503050406030204" pitchFamily="18" charset="0"/>
+                              </a:rPr>
+                            </m:ctrlPr>
+                          </m:sSubPr>
+                          <m:e>
+                            <m:r>
+                              <a:rPr lang="en-US" sz="1900" b="0" i="1" smtClean="0">
+                                <a:latin typeface="Cambria Math" panose="02040503050406030204" pitchFamily="18" charset="0"/>
+                              </a:rPr>
+                              <m:t>𝑀</m:t>
+                            </m:r>
+                          </m:e>
+                          <m:sub>
+                            <m:r>
+                              <a:rPr lang="en-US" sz="1900" b="0" i="1" smtClean="0">
+                                <a:latin typeface="Cambria Math" panose="02040503050406030204" pitchFamily="18" charset="0"/>
+                              </a:rPr>
+                              <m:t>∗</m:t>
+                            </m:r>
+                          </m:sub>
+                        </m:sSub>
+                      </m:e>
+                    </m:func>
+                    <m:r>
+                      <a:rPr lang="en-US" sz="1900" b="0" i="1" smtClean="0">
+                        <a:latin typeface="Cambria Math" panose="02040503050406030204" pitchFamily="18" charset="0"/>
+                      </a:rPr>
+                      <m:t>,</m:t>
+                    </m:r>
+                    <m:func>
+                      <m:funcPr>
+                        <m:ctrlPr>
+                          <a:rPr lang="en-US" sz="1900" b="0" i="1" smtClean="0">
+                            <a:latin typeface="Cambria Math" panose="02040503050406030204" pitchFamily="18" charset="0"/>
+                          </a:rPr>
+                        </m:ctrlPr>
+                      </m:funcPr>
+                      <m:fName>
+                        <m:r>
+                          <m:rPr>
+                            <m:sty m:val="p"/>
+                          </m:rPr>
+                          <a:rPr lang="en-US" sz="1900" b="0" i="0" smtClean="0">
+                            <a:latin typeface="Cambria Math" panose="02040503050406030204" pitchFamily="18" charset="0"/>
+                          </a:rPr>
+                          <m:t>log</m:t>
+                        </m:r>
+                      </m:fName>
+                      <m:e>
+                        <m:r>
+                          <a:rPr lang="en-US" sz="1900" b="0" i="1" smtClean="0">
+                            <a:latin typeface="Cambria Math" panose="02040503050406030204" pitchFamily="18" charset="0"/>
+                          </a:rPr>
+                          <m:t>(</m:t>
+                        </m:r>
+                        <m:r>
+                          <m:rPr>
+                            <m:sty m:val="p"/>
+                          </m:rPr>
+                          <a:rPr lang="en-US" sz="1900" b="0" i="0" smtClean="0">
+                            <a:latin typeface="Cambria Math" panose="02040503050406030204" pitchFamily="18" charset="0"/>
+                          </a:rPr>
+                          <m:t>SFR</m:t>
+                        </m:r>
+                        <m:r>
+                          <a:rPr lang="en-US" sz="1900" b="0" i="1" smtClean="0">
+                            <a:latin typeface="Cambria Math" panose="02040503050406030204" pitchFamily="18" charset="0"/>
+                          </a:rPr>
+                          <m:t>)</m:t>
+                        </m:r>
+                      </m:e>
+                    </m:func>
+                  </m:oMath>
+                </a14:m>
+                <a:r>
+                  <a:rPr lang="en-US" sz="1900" dirty="0"/>
+                  <a:t>]</a:t>
+                </a:r>
+              </a:p>
+            </p:txBody>
+          </p:sp>
+        </mc:Choice>
+        <mc:Fallback xmlns="">
+          <p:sp>
+            <p:nvSpPr>
+              <p:cNvPr id="6" name="Rounded Rectangle 5">
+                <a:extLst>
+                  <a:ext uri="{FF2B5EF4-FFF2-40B4-BE49-F238E27FC236}">
+                    <a16:creationId xmlns:a16="http://schemas.microsoft.com/office/drawing/2014/main" id="{6C865D0E-93A2-336C-BED0-C88257B6D91E}"/>
+                  </a:ext>
+                </a:extLst>
+              </p:cNvPr>
+              <p:cNvSpPr>
+                <a:spLocks noRot="1" noChangeAspect="1" noMove="1" noResize="1" noEditPoints="1" noAdjustHandles="1" noChangeArrowheads="1" noChangeShapeType="1" noTextEdit="1"/>
+              </p:cNvSpPr>
+              <p:nvPr/>
+            </p:nvSpPr>
+            <p:spPr>
+              <a:xfrm>
+                <a:off x="3683395" y="7100368"/>
+                <a:ext cx="2093719" cy="635885"/>
+              </a:xfrm>
+              <a:prstGeom prst="roundRect">
+                <a:avLst/>
+              </a:prstGeom>
+              <a:blipFill>
+                <a:blip r:embed="rId3"/>
+                <a:stretch>
+                  <a:fillRect l="-599" t="-5769" r="-599" b="-19231"/>
+                </a:stretch>
+              </a:blipFill>
+            </p:spPr>
+            <p:txBody>
+              <a:bodyPr/>
+              <a:lstStyle/>
+              <a:p>
+                <a:r>
+                  <a:rPr lang="en-US">
+                    <a:noFill/>
+                  </a:rPr>
+                  <a:t> </a:t>
+                </a:r>
+              </a:p>
+            </p:txBody>
+          </p:sp>
+        </mc:Fallback>
+      </mc:AlternateContent>
+      <p:cxnSp>
+        <p:nvCxnSpPr>
+          <p:cNvPr id="21" name="Straight Arrow Connector 20">
+            <a:extLst>
+              <a:ext uri="{FF2B5EF4-FFF2-40B4-BE49-F238E27FC236}">
+                <a16:creationId xmlns:a16="http://schemas.microsoft.com/office/drawing/2014/main" id="{27E58223-18EF-B767-3419-D496E537F284}"/>
+              </a:ext>
+            </a:extLst>
+          </p:cNvPr>
+          <p:cNvCxnSpPr>
+            <a:cxnSpLocks/>
+            <a:stCxn id="62" idx="2"/>
+          </p:cNvCxnSpPr>
+          <p:nvPr/>
+        </p:nvCxnSpPr>
+        <p:spPr>
+          <a:xfrm>
+            <a:off x="4725689" y="6357447"/>
+            <a:ext cx="0" cy="166315"/>
+          </a:xfrm>
+          <a:prstGeom prst="straightConnector1">
+            <a:avLst/>
+          </a:prstGeom>
+          <a:ln w="19050">
+            <a:solidFill>
+              <a:schemeClr val="tx1"/>
+            </a:solidFill>
+            <a:tailEnd type="triangle"/>
+          </a:ln>
+        </p:spPr>
+        <p:style>
+          <a:lnRef idx="1">
+            <a:schemeClr val="accent1"/>
+          </a:lnRef>
+          <a:fillRef idx="0">
+            <a:schemeClr val="accent1"/>
+          </a:fillRef>
+          <a:effectRef idx="0">
+            <a:schemeClr val="accent1"/>
+          </a:effectRef>
+          <a:fontRef idx="minor">
+            <a:schemeClr val="tx1"/>
+          </a:fontRef>
+        </p:style>
+      </p:cxnSp>
+      <p:sp>
+        <p:nvSpPr>
+          <p:cNvPr id="9" name="Rounded Rectangle 8">
+            <a:extLst>
+              <a:ext uri="{FF2B5EF4-FFF2-40B4-BE49-F238E27FC236}">
+                <a16:creationId xmlns:a16="http://schemas.microsoft.com/office/drawing/2014/main" id="{34150AAE-7F62-AAC1-45EE-FAEF2C28DEFC}"/>
+              </a:ext>
+            </a:extLst>
+          </p:cNvPr>
+          <p:cNvSpPr/>
+          <p:nvPr/>
+        </p:nvSpPr>
+        <p:spPr>
+          <a:xfrm>
+            <a:off x="4099472" y="6523762"/>
+            <a:ext cx="1252433" cy="410291"/>
+          </a:xfrm>
+          <a:prstGeom prst="roundRect">
+            <a:avLst/>
+          </a:prstGeom>
+          <a:solidFill>
+            <a:schemeClr val="bg2">
+              <a:lumMod val="90000"/>
+            </a:schemeClr>
+          </a:solidFill>
+        </p:spPr>
+        <p:style>
+          <a:lnRef idx="2">
+            <a:schemeClr val="dk1"/>
+          </a:lnRef>
+          <a:fillRef idx="1">
+            <a:schemeClr val="lt1"/>
+          </a:fillRef>
+          <a:effectRef idx="0">
+            <a:schemeClr val="dk1"/>
+          </a:effectRef>
+          <a:fontRef idx="minor">
+            <a:schemeClr val="dk1"/>
+          </a:fontRef>
+        </p:style>
+        <p:txBody>
+          <a:bodyPr rtlCol="0" anchor="ctr"/>
+          <a:lstStyle/>
+          <a:p>
+            <a:pPr algn="ctr"/>
+            <a:r>
+              <a:rPr lang="en-US" sz="1900" dirty="0"/>
+              <a:t>Linear</a:t>
+            </a:r>
+            <a:r>
+              <a:rPr lang="en-US" sz="1100" dirty="0"/>
+              <a:t> </a:t>
+            </a:r>
+            <a:r>
+              <a:rPr lang="en-US" sz="1900" dirty="0"/>
+              <a:t>(3)</a:t>
+            </a:r>
+          </a:p>
+        </p:txBody>
+      </p:sp>
+      <p:sp>
+        <p:nvSpPr>
+          <p:cNvPr id="13" name="Rounded Rectangle 12">
+            <a:extLst>
+              <a:ext uri="{FF2B5EF4-FFF2-40B4-BE49-F238E27FC236}">
+                <a16:creationId xmlns:a16="http://schemas.microsoft.com/office/drawing/2014/main" id="{1C3E3058-90DE-97BB-EE31-7A48C0CABAC9}"/>
+              </a:ext>
+            </a:extLst>
+          </p:cNvPr>
+          <p:cNvSpPr/>
+          <p:nvPr/>
+        </p:nvSpPr>
+        <p:spPr>
+          <a:xfrm>
+            <a:off x="4664854" y="2764532"/>
+            <a:ext cx="1217684" cy="635885"/>
+          </a:xfrm>
+          <a:prstGeom prst="roundRect">
+            <a:avLst/>
+          </a:prstGeom>
+          <a:solidFill>
+            <a:schemeClr val="accent6">
+              <a:lumMod val="40000"/>
+              <a:lumOff val="60000"/>
+            </a:schemeClr>
+          </a:solidFill>
+        </p:spPr>
+        <p:style>
+          <a:lnRef idx="2">
+            <a:schemeClr val="dk1"/>
+          </a:lnRef>
+          <a:fillRef idx="1">
+            <a:schemeClr val="lt1"/>
+          </a:fillRef>
+          <a:effectRef idx="0">
+            <a:schemeClr val="dk1"/>
+          </a:effectRef>
+          <a:fontRef idx="minor">
+            <a:schemeClr val="dk1"/>
+          </a:fontRef>
+        </p:style>
+        <p:txBody>
+          <a:bodyPr rtlCol="0" anchor="ctr"/>
+          <a:lstStyle/>
+          <a:p>
+            <a:pPr algn="ctr"/>
+            <a:r>
+              <a:rPr lang="en-US" sz="1900" dirty="0"/>
+              <a:t>Host Redshift</a:t>
+            </a:r>
+          </a:p>
+        </p:txBody>
+      </p:sp>
+      <p:cxnSp>
+        <p:nvCxnSpPr>
+          <p:cNvPr id="20" name="Straight Arrow Connector 37">
+            <a:extLst>
+              <a:ext uri="{FF2B5EF4-FFF2-40B4-BE49-F238E27FC236}">
+                <a16:creationId xmlns:a16="http://schemas.microsoft.com/office/drawing/2014/main" id="{FF0EE005-A80E-1064-D984-43CEEB1D2D3C}"/>
+              </a:ext>
+            </a:extLst>
+          </p:cNvPr>
+          <p:cNvCxnSpPr>
+            <a:cxnSpLocks/>
+            <a:stCxn id="13" idx="2"/>
+            <a:endCxn id="57" idx="0"/>
+          </p:cNvCxnSpPr>
+          <p:nvPr/>
+        </p:nvCxnSpPr>
+        <p:spPr>
+          <a:xfrm rot="5400000">
+            <a:off x="4879536" y="3246571"/>
+            <a:ext cx="240315" cy="548007"/>
+          </a:xfrm>
+          <a:prstGeom prst="curvedConnector3">
+            <a:avLst>
+              <a:gd name="adj1" fmla="val 50000"/>
+            </a:avLst>
+          </a:prstGeom>
+          <a:ln w="28575">
+            <a:solidFill>
+              <a:schemeClr val="tx1"/>
+            </a:solidFill>
+            <a:tailEnd type="triangle"/>
+          </a:ln>
+        </p:spPr>
+        <p:style>
+          <a:lnRef idx="1">
+            <a:schemeClr val="accent1"/>
+          </a:lnRef>
+          <a:fillRef idx="0">
+            <a:schemeClr val="accent1"/>
+          </a:fillRef>
+          <a:effectRef idx="0">
+            <a:schemeClr val="accent1"/>
+          </a:effectRef>
+          <a:fontRef idx="minor">
+            <a:schemeClr val="tx1"/>
+          </a:fontRef>
+        </p:style>
+      </p:cxnSp>
+    </p:spTree>
+    <p:extLst>
+      <p:ext uri="{BB962C8B-B14F-4D97-AF65-F5344CB8AC3E}">
+        <p14:creationId xmlns:p14="http://schemas.microsoft.com/office/powerpoint/2010/main" val="617100277"/>
       </p:ext>
     </p:extLst>
   </p:cSld>

</xml_diff>

<commit_message>
Finish everything (I think for real this time)
</commit_message>
<xml_diff>
--- a/Paper/Figures/NN Architecture.pptx
+++ b/Paper/Figures/NN Architecture.pptx
@@ -201,7 +201,7 @@
           <a:p>
             <a:fld id="{5CBE71E4-C66C-9045-A3F0-793622CB0424}" type="datetimeFigureOut">
               <a:rPr lang="en-US" smtClean="0"/>
-              <a:t>2/24/25</a:t>
+              <a:t>3/27/25</a:t>
             </a:fld>
             <a:endParaRPr lang="en-US"/>
           </a:p>
@@ -1116,7 +1116,7 @@
           <a:p>
             <a:fld id="{008797F6-C3EC-C742-9153-6E65A2DA26D7}" type="datetimeFigureOut">
               <a:rPr lang="en-US" smtClean="0"/>
-              <a:t>2/24/25</a:t>
+              <a:t>3/27/25</a:t>
             </a:fld>
             <a:endParaRPr lang="en-US"/>
           </a:p>
@@ -1286,7 +1286,7 @@
           <a:p>
             <a:fld id="{008797F6-C3EC-C742-9153-6E65A2DA26D7}" type="datetimeFigureOut">
               <a:rPr lang="en-US" smtClean="0"/>
-              <a:t>2/24/25</a:t>
+              <a:t>3/27/25</a:t>
             </a:fld>
             <a:endParaRPr lang="en-US"/>
           </a:p>
@@ -1466,7 +1466,7 @@
           <a:p>
             <a:fld id="{008797F6-C3EC-C742-9153-6E65A2DA26D7}" type="datetimeFigureOut">
               <a:rPr lang="en-US" smtClean="0"/>
-              <a:t>2/24/25</a:t>
+              <a:t>3/27/25</a:t>
             </a:fld>
             <a:endParaRPr lang="en-US"/>
           </a:p>
@@ -1636,7 +1636,7 @@
           <a:p>
             <a:fld id="{008797F6-C3EC-C742-9153-6E65A2DA26D7}" type="datetimeFigureOut">
               <a:rPr lang="en-US" smtClean="0"/>
-              <a:t>2/24/25</a:t>
+              <a:t>3/27/25</a:t>
             </a:fld>
             <a:endParaRPr lang="en-US"/>
           </a:p>
@@ -1882,7 +1882,7 @@
           <a:p>
             <a:fld id="{008797F6-C3EC-C742-9153-6E65A2DA26D7}" type="datetimeFigureOut">
               <a:rPr lang="en-US" smtClean="0"/>
-              <a:t>2/24/25</a:t>
+              <a:t>3/27/25</a:t>
             </a:fld>
             <a:endParaRPr lang="en-US"/>
           </a:p>
@@ -2114,7 +2114,7 @@
           <a:p>
             <a:fld id="{008797F6-C3EC-C742-9153-6E65A2DA26D7}" type="datetimeFigureOut">
               <a:rPr lang="en-US" smtClean="0"/>
-              <a:t>2/24/25</a:t>
+              <a:t>3/27/25</a:t>
             </a:fld>
             <a:endParaRPr lang="en-US"/>
           </a:p>
@@ -2481,7 +2481,7 @@
           <a:p>
             <a:fld id="{008797F6-C3EC-C742-9153-6E65A2DA26D7}" type="datetimeFigureOut">
               <a:rPr lang="en-US" smtClean="0"/>
-              <a:t>2/24/25</a:t>
+              <a:t>3/27/25</a:t>
             </a:fld>
             <a:endParaRPr lang="en-US"/>
           </a:p>
@@ -2599,7 +2599,7 @@
           <a:p>
             <a:fld id="{008797F6-C3EC-C742-9153-6E65A2DA26D7}" type="datetimeFigureOut">
               <a:rPr lang="en-US" smtClean="0"/>
-              <a:t>2/24/25</a:t>
+              <a:t>3/27/25</a:t>
             </a:fld>
             <a:endParaRPr lang="en-US"/>
           </a:p>
@@ -2694,7 +2694,7 @@
           <a:p>
             <a:fld id="{008797F6-C3EC-C742-9153-6E65A2DA26D7}" type="datetimeFigureOut">
               <a:rPr lang="en-US" smtClean="0"/>
-              <a:t>2/24/25</a:t>
+              <a:t>3/27/25</a:t>
             </a:fld>
             <a:endParaRPr lang="en-US"/>
           </a:p>
@@ -2971,7 +2971,7 @@
           <a:p>
             <a:fld id="{008797F6-C3EC-C742-9153-6E65A2DA26D7}" type="datetimeFigureOut">
               <a:rPr lang="en-US" smtClean="0"/>
-              <a:t>2/24/25</a:t>
+              <a:t>3/27/25</a:t>
             </a:fld>
             <a:endParaRPr lang="en-US"/>
           </a:p>
@@ -3228,7 +3228,7 @@
           <a:p>
             <a:fld id="{008797F6-C3EC-C742-9153-6E65A2DA26D7}" type="datetimeFigureOut">
               <a:rPr lang="en-US" smtClean="0"/>
-              <a:t>2/24/25</a:t>
+              <a:t>3/27/25</a:t>
             </a:fld>
             <a:endParaRPr lang="en-US"/>
           </a:p>
@@ -3441,7 +3441,7 @@
           <a:p>
             <a:fld id="{008797F6-C3EC-C742-9153-6E65A2DA26D7}" type="datetimeFigureOut">
               <a:rPr lang="en-US" smtClean="0"/>
-              <a:t>2/24/25</a:t>
+              <a:t>3/27/25</a:t>
             </a:fld>
             <a:endParaRPr lang="en-US"/>
           </a:p>
@@ -11232,7 +11232,7 @@
         </p:nvCxnSpPr>
         <p:spPr>
           <a:xfrm rot="16200000" flipH="1">
-            <a:off x="4644815" y="7014927"/>
+            <a:off x="4644815" y="7586985"/>
             <a:ext cx="166315" cy="4566"/>
           </a:xfrm>
           <a:prstGeom prst="curvedConnector3">
@@ -11262,8 +11262,8 @@
           </a:fontRef>
         </p:style>
       </p:cxnSp>
-      <mc:AlternateContent xmlns:mc="http://schemas.openxmlformats.org/markup-compatibility/2006" xmlns:a14="http://schemas.microsoft.com/office/drawing/2010/main">
-        <mc:Choice Requires="a14">
+      <mc:AlternateContent xmlns:mc="http://schemas.openxmlformats.org/markup-compatibility/2006">
+        <mc:Choice xmlns:a14="http://schemas.microsoft.com/office/drawing/2010/main" Requires="a14">
           <p:sp>
             <p:nvSpPr>
               <p:cNvPr id="6" name="Rounded Rectangle 5">
@@ -11278,7 +11278,7 @@
             </p:nvSpPr>
             <p:spPr>
               <a:xfrm>
-                <a:off x="3683395" y="7100368"/>
+                <a:off x="3683395" y="7672426"/>
                 <a:ext cx="2093719" cy="635885"/>
               </a:xfrm>
               <a:prstGeom prst="roundRect">
@@ -11429,13 +11429,13 @@
             </p:txBody>
           </p:sp>
         </mc:Choice>
-        <mc:Fallback xmlns="">
+        <mc:Fallback>
           <p:sp>
             <p:nvSpPr>
               <p:cNvPr id="6" name="Rounded Rectangle 5">
                 <a:extLst>
                   <a:ext uri="{FF2B5EF4-FFF2-40B4-BE49-F238E27FC236}">
-                    <a16:creationId xmlns:a16="http://schemas.microsoft.com/office/drawing/2014/main" id="{6C865D0E-93A2-336C-BED0-C88257B6D91E}"/>
+                    <a16:creationId xmlns:a16="http://schemas.microsoft.com/office/drawing/2014/main" id="{C4155A2C-8878-6A25-D80A-A73C1C2E852A}"/>
                   </a:ext>
                 </a:extLst>
               </p:cNvPr>
@@ -11446,7 +11446,7 @@
             </p:nvSpPr>
             <p:spPr>
               <a:xfrm>
-                <a:off x="3683395" y="7100368"/>
+                <a:off x="3683395" y="7672426"/>
                 <a:ext cx="2093719" cy="635885"/>
               </a:xfrm>
               <a:prstGeom prst="roundRect">
@@ -11533,7 +11533,7 @@
         </p:nvSpPr>
         <p:spPr>
           <a:xfrm>
-            <a:off x="4099472" y="6523762"/>
+            <a:off x="4099472" y="7095820"/>
             <a:ext cx="1252433" cy="410291"/>
           </a:xfrm>
           <a:prstGeom prst="roundRect">
@@ -11574,7 +11574,7 @@
             </a:r>
             <a:r>
               <a:rPr lang="en-US" sz="1900" dirty="0"/>
-              <a:t>(3)</a:t>
+              <a:t>(2)</a:t>
             </a:r>
           </a:p>
         </p:txBody>
@@ -11659,6 +11659,104 @@
             </a:avLst>
           </a:prstGeom>
           <a:ln w="28575">
+            <a:solidFill>
+              <a:schemeClr val="tx1"/>
+            </a:solidFill>
+            <a:tailEnd type="triangle"/>
+          </a:ln>
+        </p:spPr>
+        <p:style>
+          <a:lnRef idx="1">
+            <a:schemeClr val="accent1"/>
+          </a:lnRef>
+          <a:fillRef idx="0">
+            <a:schemeClr val="accent1"/>
+          </a:fillRef>
+          <a:effectRef idx="0">
+            <a:schemeClr val="accent1"/>
+          </a:effectRef>
+          <a:fontRef idx="minor">
+            <a:schemeClr val="tx1"/>
+          </a:fontRef>
+        </p:style>
+      </p:cxnSp>
+      <p:sp>
+        <p:nvSpPr>
+          <p:cNvPr id="2" name="Rounded Rectangle 1">
+            <a:extLst>
+              <a:ext uri="{FF2B5EF4-FFF2-40B4-BE49-F238E27FC236}">
+                <a16:creationId xmlns:a16="http://schemas.microsoft.com/office/drawing/2014/main" id="{7DB3D171-6D70-3315-9278-49CE99A0C305}"/>
+              </a:ext>
+            </a:extLst>
+          </p:cNvPr>
+          <p:cNvSpPr/>
+          <p:nvPr/>
+        </p:nvSpPr>
+        <p:spPr>
+          <a:xfrm>
+            <a:off x="4099472" y="6521488"/>
+            <a:ext cx="1252433" cy="410291"/>
+          </a:xfrm>
+          <a:prstGeom prst="roundRect">
+            <a:avLst/>
+          </a:prstGeom>
+          <a:solidFill>
+            <a:schemeClr val="accent1">
+              <a:lumMod val="60000"/>
+              <a:lumOff val="40000"/>
+            </a:schemeClr>
+          </a:solidFill>
+        </p:spPr>
+        <p:style>
+          <a:lnRef idx="2">
+            <a:schemeClr val="dk1"/>
+          </a:lnRef>
+          <a:fillRef idx="1">
+            <a:schemeClr val="lt1"/>
+          </a:fillRef>
+          <a:effectRef idx="0">
+            <a:schemeClr val="dk1"/>
+          </a:effectRef>
+          <a:fontRef idx="minor">
+            <a:schemeClr val="dk1"/>
+          </a:fontRef>
+        </p:style>
+        <p:txBody>
+          <a:bodyPr rtlCol="0" anchor="ctr"/>
+          <a:lstStyle/>
+          <a:p>
+            <a:pPr algn="ctr"/>
+            <a:r>
+              <a:rPr lang="en-US" sz="1900" dirty="0"/>
+              <a:t>Linear (3)</a:t>
+            </a:r>
+          </a:p>
+        </p:txBody>
+      </p:sp>
+      <p:cxnSp>
+        <p:nvCxnSpPr>
+          <p:cNvPr id="3" name="Straight Arrow Connector 2">
+            <a:extLst>
+              <a:ext uri="{FF2B5EF4-FFF2-40B4-BE49-F238E27FC236}">
+                <a16:creationId xmlns:a16="http://schemas.microsoft.com/office/drawing/2014/main" id="{B4A430B8-9069-299C-7CC0-95159E150319}"/>
+              </a:ext>
+            </a:extLst>
+          </p:cNvPr>
+          <p:cNvCxnSpPr>
+            <a:cxnSpLocks/>
+            <a:stCxn id="2" idx="2"/>
+          </p:cNvCxnSpPr>
+          <p:nvPr/>
+        </p:nvCxnSpPr>
+        <p:spPr>
+          <a:xfrm>
+            <a:off x="4725689" y="6931779"/>
+            <a:ext cx="0" cy="166315"/>
+          </a:xfrm>
+          <a:prstGeom prst="straightConnector1">
+            <a:avLst/>
+          </a:prstGeom>
+          <a:ln w="19050">
             <a:solidFill>
               <a:schemeClr val="tx1"/>
             </a:solidFill>

</xml_diff>